<commit_message>
Added videos for global snapshots, logical clocks for distributed systems
</commit_message>
<xml_diff>
--- a/ChannelSnapshots/ChannelSnapshots_Figures.pptx
+++ b/ChannelSnapshots/ChannelSnapshots_Figures.pptx
@@ -18,6 +18,8 @@
     <p:sldId id="268" r:id="rId12"/>
     <p:sldId id="269" r:id="rId13"/>
     <p:sldId id="270" r:id="rId14"/>
+    <p:sldId id="271" r:id="rId15"/>
+    <p:sldId id="272" r:id="rId16"/>
   </p:sldIdLst>
   <p:sldSz cx="9144000" cy="6858000" type="screen4x3"/>
   <p:notesSz cx="6858000" cy="9144000"/>
@@ -10021,6 +10023,2874 @@
 </p:sld>
 </file>
 
+<file path=ppt/slides/slide14.xml><?xml version="1.0" encoding="utf-8"?>
+<p:sld xmlns:a="http://schemas.openxmlformats.org/drawingml/2006/main" xmlns:r="http://schemas.openxmlformats.org/officeDocument/2006/relationships" xmlns:p="http://schemas.openxmlformats.org/presentationml/2006/main">
+  <p:cSld>
+    <p:spTree>
+      <p:nvGrpSpPr>
+        <p:cNvPr id="1" name=""/>
+        <p:cNvGrpSpPr/>
+        <p:nvPr/>
+      </p:nvGrpSpPr>
+      <p:grpSpPr>
+        <a:xfrm>
+          <a:off x="0" y="0"/>
+          <a:ext cx="0" cy="0"/>
+          <a:chOff x="0" y="0"/>
+          <a:chExt cx="0" cy="0"/>
+        </a:xfrm>
+      </p:grpSpPr>
+      <p:sp>
+        <p:nvSpPr>
+          <p:cNvPr id="10" name="TextBox 9"/>
+          <p:cNvSpPr txBox="1"/>
+          <p:nvPr/>
+        </p:nvSpPr>
+        <p:spPr>
+          <a:xfrm>
+            <a:off x="10764169" y="1140661"/>
+            <a:ext cx="184666" cy="369332"/>
+          </a:xfrm>
+          <a:prstGeom prst="rect">
+            <a:avLst/>
+          </a:prstGeom>
+          <a:noFill/>
+          <a:ln>
+            <a:solidFill>
+              <a:schemeClr val="tx1"/>
+            </a:solidFill>
+            <a:prstDash val="dash"/>
+          </a:ln>
+        </p:spPr>
+        <p:txBody>
+          <a:bodyPr wrap="none" rtlCol="0">
+            <a:spAutoFit/>
+          </a:bodyPr>
+          <a:lstStyle/>
+          <a:p>
+            <a:endParaRPr lang="en-US" dirty="0"/>
+          </a:p>
+        </p:txBody>
+      </p:sp>
+      <p:cxnSp>
+        <p:nvCxnSpPr>
+          <p:cNvPr id="65" name="Straight Arrow Connector 64"/>
+          <p:cNvCxnSpPr/>
+          <p:nvPr/>
+        </p:nvCxnSpPr>
+        <p:spPr>
+          <a:xfrm flipV="1">
+            <a:off x="291909" y="2475899"/>
+            <a:ext cx="8922606" cy="49548"/>
+          </a:xfrm>
+          <a:prstGeom prst="straightConnector1">
+            <a:avLst/>
+          </a:prstGeom>
+          <a:ln w="76200" cmpd="sng">
+            <a:tailEnd type="arrow"/>
+          </a:ln>
+        </p:spPr>
+        <p:style>
+          <a:lnRef idx="2">
+            <a:schemeClr val="accent1"/>
+          </a:lnRef>
+          <a:fillRef idx="0">
+            <a:schemeClr val="accent1"/>
+          </a:fillRef>
+          <a:effectRef idx="1">
+            <a:schemeClr val="accent1"/>
+          </a:effectRef>
+          <a:fontRef idx="minor">
+            <a:schemeClr val="tx1"/>
+          </a:fontRef>
+        </p:style>
+      </p:cxnSp>
+      <p:cxnSp>
+        <p:nvCxnSpPr>
+          <p:cNvPr id="66" name="Straight Arrow Connector 65"/>
+          <p:cNvCxnSpPr/>
+          <p:nvPr/>
+        </p:nvCxnSpPr>
+        <p:spPr>
+          <a:xfrm flipV="1">
+            <a:off x="70515" y="1408356"/>
+            <a:ext cx="9144000" cy="49548"/>
+          </a:xfrm>
+          <a:prstGeom prst="straightConnector1">
+            <a:avLst/>
+          </a:prstGeom>
+          <a:ln w="76200" cmpd="sng">
+            <a:tailEnd type="arrow"/>
+          </a:ln>
+        </p:spPr>
+        <p:style>
+          <a:lnRef idx="2">
+            <a:schemeClr val="accent1"/>
+          </a:lnRef>
+          <a:fillRef idx="0">
+            <a:schemeClr val="accent1"/>
+          </a:fillRef>
+          <a:effectRef idx="1">
+            <a:schemeClr val="accent1"/>
+          </a:effectRef>
+          <a:fontRef idx="minor">
+            <a:schemeClr val="tx1"/>
+          </a:fontRef>
+        </p:style>
+      </p:cxnSp>
+      <p:cxnSp>
+        <p:nvCxnSpPr>
+          <p:cNvPr id="68" name="Straight Arrow Connector 67"/>
+          <p:cNvCxnSpPr>
+            <a:endCxn id="86" idx="1"/>
+          </p:cNvCxnSpPr>
+          <p:nvPr/>
+        </p:nvCxnSpPr>
+        <p:spPr>
+          <a:xfrm>
+            <a:off x="2042177" y="1457904"/>
+            <a:ext cx="1039225" cy="959797"/>
+          </a:xfrm>
+          <a:prstGeom prst="straightConnector1">
+            <a:avLst/>
+          </a:prstGeom>
+          <a:ln w="76200" cmpd="sng">
+            <a:solidFill>
+              <a:srgbClr val="FF0000"/>
+            </a:solidFill>
+            <a:prstDash val="solid"/>
+            <a:tailEnd type="arrow"/>
+          </a:ln>
+        </p:spPr>
+        <p:style>
+          <a:lnRef idx="2">
+            <a:schemeClr val="accent1"/>
+          </a:lnRef>
+          <a:fillRef idx="0">
+            <a:schemeClr val="accent1"/>
+          </a:fillRef>
+          <a:effectRef idx="1">
+            <a:schemeClr val="accent1"/>
+          </a:effectRef>
+          <a:fontRef idx="minor">
+            <a:schemeClr val="tx1"/>
+          </a:fontRef>
+        </p:style>
+      </p:cxnSp>
+      <p:cxnSp>
+        <p:nvCxnSpPr>
+          <p:cNvPr id="69" name="Straight Arrow Connector 68"/>
+          <p:cNvCxnSpPr>
+            <a:stCxn id="80" idx="6"/>
+            <a:endCxn id="85" idx="3"/>
+          </p:cNvCxnSpPr>
+          <p:nvPr/>
+        </p:nvCxnSpPr>
+        <p:spPr>
+          <a:xfrm flipV="1">
+            <a:off x="4807238" y="1505343"/>
+            <a:ext cx="1549128" cy="1030294"/>
+          </a:xfrm>
+          <a:prstGeom prst="straightConnector1">
+            <a:avLst/>
+          </a:prstGeom>
+          <a:ln w="76200" cmpd="sng">
+            <a:solidFill>
+              <a:srgbClr val="FF0000"/>
+            </a:solidFill>
+            <a:prstDash val="solid"/>
+            <a:tailEnd type="arrow"/>
+          </a:ln>
+        </p:spPr>
+        <p:style>
+          <a:lnRef idx="2">
+            <a:schemeClr val="accent1"/>
+          </a:lnRef>
+          <a:fillRef idx="0">
+            <a:schemeClr val="accent1"/>
+          </a:fillRef>
+          <a:effectRef idx="1">
+            <a:schemeClr val="accent1"/>
+          </a:effectRef>
+          <a:fontRef idx="minor">
+            <a:schemeClr val="tx1"/>
+          </a:fontRef>
+        </p:style>
+      </p:cxnSp>
+      <p:cxnSp>
+        <p:nvCxnSpPr>
+          <p:cNvPr id="70" name="Straight Arrow Connector 69"/>
+          <p:cNvCxnSpPr>
+            <a:stCxn id="84" idx="5"/>
+            <a:endCxn id="83" idx="0"/>
+          </p:cNvCxnSpPr>
+          <p:nvPr/>
+        </p:nvCxnSpPr>
+        <p:spPr>
+          <a:xfrm>
+            <a:off x="7326480" y="1505343"/>
+            <a:ext cx="913267" cy="868361"/>
+          </a:xfrm>
+          <a:prstGeom prst="straightConnector1">
+            <a:avLst/>
+          </a:prstGeom>
+          <a:ln w="76200" cmpd="sng">
+            <a:solidFill>
+              <a:srgbClr val="FF0000"/>
+            </a:solidFill>
+            <a:prstDash val="solid"/>
+            <a:tailEnd type="arrow"/>
+          </a:ln>
+        </p:spPr>
+        <p:style>
+          <a:lnRef idx="2">
+            <a:schemeClr val="accent1"/>
+          </a:lnRef>
+          <a:fillRef idx="0">
+            <a:schemeClr val="accent1"/>
+          </a:fillRef>
+          <a:effectRef idx="1">
+            <a:schemeClr val="accent1"/>
+          </a:effectRef>
+          <a:fontRef idx="minor">
+            <a:schemeClr val="tx1"/>
+          </a:fontRef>
+        </p:style>
+      </p:cxnSp>
+      <p:sp>
+        <p:nvSpPr>
+          <p:cNvPr id="72" name="Oval 71"/>
+          <p:cNvSpPr>
+            <a:spLocks noChangeAspect="1"/>
+          </p:cNvSpPr>
+          <p:nvPr/>
+        </p:nvSpPr>
+        <p:spPr>
+          <a:xfrm>
+            <a:off x="484752" y="1320744"/>
+            <a:ext cx="274320" cy="274320"/>
+          </a:xfrm>
+          <a:prstGeom prst="ellipse">
+            <a:avLst/>
+          </a:prstGeom>
+        </p:spPr>
+        <p:style>
+          <a:lnRef idx="1">
+            <a:schemeClr val="accent1"/>
+          </a:lnRef>
+          <a:fillRef idx="3">
+            <a:schemeClr val="accent1"/>
+          </a:fillRef>
+          <a:effectRef idx="2">
+            <a:schemeClr val="accent1"/>
+          </a:effectRef>
+          <a:fontRef idx="minor">
+            <a:schemeClr val="lt1"/>
+          </a:fontRef>
+        </p:style>
+        <p:txBody>
+          <a:bodyPr rtlCol="0" anchor="ctr"/>
+          <a:lstStyle/>
+          <a:p>
+            <a:pPr algn="ctr"/>
+            <a:endParaRPr lang="en-US" dirty="0"/>
+          </a:p>
+        </p:txBody>
+      </p:sp>
+      <p:sp>
+        <p:nvSpPr>
+          <p:cNvPr id="74" name="Oval 73"/>
+          <p:cNvSpPr>
+            <a:spLocks noChangeAspect="1"/>
+          </p:cNvSpPr>
+          <p:nvPr/>
+        </p:nvSpPr>
+        <p:spPr>
+          <a:xfrm>
+            <a:off x="1255385" y="1323696"/>
+            <a:ext cx="274320" cy="274320"/>
+          </a:xfrm>
+          <a:prstGeom prst="ellipse">
+            <a:avLst/>
+          </a:prstGeom>
+        </p:spPr>
+        <p:style>
+          <a:lnRef idx="1">
+            <a:schemeClr val="accent1"/>
+          </a:lnRef>
+          <a:fillRef idx="3">
+            <a:schemeClr val="accent1"/>
+          </a:fillRef>
+          <a:effectRef idx="2">
+            <a:schemeClr val="accent1"/>
+          </a:effectRef>
+          <a:fontRef idx="minor">
+            <a:schemeClr val="lt1"/>
+          </a:fontRef>
+        </p:style>
+        <p:txBody>
+          <a:bodyPr rtlCol="0" anchor="ctr"/>
+          <a:lstStyle/>
+          <a:p>
+            <a:pPr algn="ctr"/>
+            <a:endParaRPr lang="en-US"/>
+          </a:p>
+        </p:txBody>
+      </p:sp>
+      <p:sp>
+        <p:nvSpPr>
+          <p:cNvPr id="75" name="Oval 74"/>
+          <p:cNvSpPr>
+            <a:spLocks noChangeAspect="1"/>
+          </p:cNvSpPr>
+          <p:nvPr/>
+        </p:nvSpPr>
+        <p:spPr>
+          <a:xfrm>
+            <a:off x="1997557" y="1343359"/>
+            <a:ext cx="274320" cy="274320"/>
+          </a:xfrm>
+          <a:prstGeom prst="ellipse">
+            <a:avLst/>
+          </a:prstGeom>
+        </p:spPr>
+        <p:style>
+          <a:lnRef idx="1">
+            <a:schemeClr val="accent1"/>
+          </a:lnRef>
+          <a:fillRef idx="3">
+            <a:schemeClr val="accent1"/>
+          </a:fillRef>
+          <a:effectRef idx="2">
+            <a:schemeClr val="accent1"/>
+          </a:effectRef>
+          <a:fontRef idx="minor">
+            <a:schemeClr val="lt1"/>
+          </a:fontRef>
+        </p:style>
+        <p:txBody>
+          <a:bodyPr rtlCol="0" anchor="ctr"/>
+          <a:lstStyle/>
+          <a:p>
+            <a:pPr algn="ctr"/>
+            <a:endParaRPr lang="en-US"/>
+          </a:p>
+        </p:txBody>
+      </p:sp>
+      <p:sp>
+        <p:nvSpPr>
+          <p:cNvPr id="76" name="Oval 75"/>
+          <p:cNvSpPr>
+            <a:spLocks noChangeAspect="1"/>
+          </p:cNvSpPr>
+          <p:nvPr/>
+        </p:nvSpPr>
+        <p:spPr>
+          <a:xfrm>
+            <a:off x="981065" y="2388287"/>
+            <a:ext cx="274320" cy="274320"/>
+          </a:xfrm>
+          <a:prstGeom prst="ellipse">
+            <a:avLst/>
+          </a:prstGeom>
+        </p:spPr>
+        <p:style>
+          <a:lnRef idx="1">
+            <a:schemeClr val="accent1"/>
+          </a:lnRef>
+          <a:fillRef idx="3">
+            <a:schemeClr val="accent1"/>
+          </a:fillRef>
+          <a:effectRef idx="2">
+            <a:schemeClr val="accent1"/>
+          </a:effectRef>
+          <a:fontRef idx="minor">
+            <a:schemeClr val="lt1"/>
+          </a:fontRef>
+        </p:style>
+        <p:txBody>
+          <a:bodyPr rtlCol="0" anchor="ctr"/>
+          <a:lstStyle/>
+          <a:p>
+            <a:pPr algn="ctr"/>
+            <a:endParaRPr lang="en-US"/>
+          </a:p>
+        </p:txBody>
+      </p:sp>
+      <p:sp>
+        <p:nvSpPr>
+          <p:cNvPr id="78" name="Oval 77"/>
+          <p:cNvSpPr>
+            <a:spLocks noChangeAspect="1"/>
+          </p:cNvSpPr>
+          <p:nvPr/>
+        </p:nvSpPr>
+        <p:spPr>
+          <a:xfrm>
+            <a:off x="3730336" y="2389243"/>
+            <a:ext cx="274320" cy="274320"/>
+          </a:xfrm>
+          <a:prstGeom prst="ellipse">
+            <a:avLst/>
+          </a:prstGeom>
+        </p:spPr>
+        <p:style>
+          <a:lnRef idx="1">
+            <a:schemeClr val="accent1"/>
+          </a:lnRef>
+          <a:fillRef idx="3">
+            <a:schemeClr val="accent1"/>
+          </a:fillRef>
+          <a:effectRef idx="2">
+            <a:schemeClr val="accent1"/>
+          </a:effectRef>
+          <a:fontRef idx="minor">
+            <a:schemeClr val="lt1"/>
+          </a:fontRef>
+        </p:style>
+        <p:txBody>
+          <a:bodyPr rtlCol="0" anchor="ctr"/>
+          <a:lstStyle/>
+          <a:p>
+            <a:pPr algn="ctr"/>
+            <a:endParaRPr lang="en-US"/>
+          </a:p>
+        </p:txBody>
+      </p:sp>
+      <p:sp>
+        <p:nvSpPr>
+          <p:cNvPr id="80" name="Oval 79"/>
+          <p:cNvSpPr>
+            <a:spLocks noChangeAspect="1"/>
+          </p:cNvSpPr>
+          <p:nvPr/>
+        </p:nvSpPr>
+        <p:spPr>
+          <a:xfrm>
+            <a:off x="4532918" y="2398477"/>
+            <a:ext cx="274320" cy="274320"/>
+          </a:xfrm>
+          <a:prstGeom prst="ellipse">
+            <a:avLst/>
+          </a:prstGeom>
+        </p:spPr>
+        <p:style>
+          <a:lnRef idx="1">
+            <a:schemeClr val="accent1"/>
+          </a:lnRef>
+          <a:fillRef idx="3">
+            <a:schemeClr val="accent1"/>
+          </a:fillRef>
+          <a:effectRef idx="2">
+            <a:schemeClr val="accent1"/>
+          </a:effectRef>
+          <a:fontRef idx="minor">
+            <a:schemeClr val="lt1"/>
+          </a:fontRef>
+        </p:style>
+        <p:txBody>
+          <a:bodyPr rtlCol="0" anchor="ctr"/>
+          <a:lstStyle/>
+          <a:p>
+            <a:pPr algn="ctr"/>
+            <a:endParaRPr lang="en-US"/>
+          </a:p>
+        </p:txBody>
+      </p:sp>
+      <p:sp>
+        <p:nvSpPr>
+          <p:cNvPr id="81" name="Oval 80"/>
+          <p:cNvSpPr>
+            <a:spLocks noChangeAspect="1"/>
+          </p:cNvSpPr>
+          <p:nvPr/>
+        </p:nvSpPr>
+        <p:spPr>
+          <a:xfrm>
+            <a:off x="5296025" y="2338739"/>
+            <a:ext cx="274320" cy="274320"/>
+          </a:xfrm>
+          <a:prstGeom prst="ellipse">
+            <a:avLst/>
+          </a:prstGeom>
+        </p:spPr>
+        <p:style>
+          <a:lnRef idx="1">
+            <a:schemeClr val="accent1"/>
+          </a:lnRef>
+          <a:fillRef idx="3">
+            <a:schemeClr val="accent1"/>
+          </a:fillRef>
+          <a:effectRef idx="2">
+            <a:schemeClr val="accent1"/>
+          </a:effectRef>
+          <a:fontRef idx="minor">
+            <a:schemeClr val="lt1"/>
+          </a:fontRef>
+        </p:style>
+        <p:txBody>
+          <a:bodyPr rtlCol="0" anchor="ctr"/>
+          <a:lstStyle/>
+          <a:p>
+            <a:pPr algn="ctr"/>
+            <a:endParaRPr lang="en-US"/>
+          </a:p>
+        </p:txBody>
+      </p:sp>
+      <p:sp>
+        <p:nvSpPr>
+          <p:cNvPr id="82" name="Oval 81"/>
+          <p:cNvSpPr>
+            <a:spLocks noChangeAspect="1"/>
+          </p:cNvSpPr>
+          <p:nvPr/>
+        </p:nvSpPr>
+        <p:spPr>
+          <a:xfrm>
+            <a:off x="6148184" y="2374074"/>
+            <a:ext cx="274320" cy="274320"/>
+          </a:xfrm>
+          <a:prstGeom prst="ellipse">
+            <a:avLst/>
+          </a:prstGeom>
+        </p:spPr>
+        <p:style>
+          <a:lnRef idx="1">
+            <a:schemeClr val="accent1"/>
+          </a:lnRef>
+          <a:fillRef idx="3">
+            <a:schemeClr val="accent1"/>
+          </a:fillRef>
+          <a:effectRef idx="2">
+            <a:schemeClr val="accent1"/>
+          </a:effectRef>
+          <a:fontRef idx="minor">
+            <a:schemeClr val="lt1"/>
+          </a:fontRef>
+        </p:style>
+        <p:txBody>
+          <a:bodyPr rtlCol="0" anchor="ctr"/>
+          <a:lstStyle/>
+          <a:p>
+            <a:pPr algn="ctr"/>
+            <a:endParaRPr lang="en-US"/>
+          </a:p>
+        </p:txBody>
+      </p:sp>
+      <p:sp>
+        <p:nvSpPr>
+          <p:cNvPr id="83" name="Oval 82"/>
+          <p:cNvSpPr>
+            <a:spLocks noChangeAspect="1"/>
+          </p:cNvSpPr>
+          <p:nvPr/>
+        </p:nvSpPr>
+        <p:spPr>
+          <a:xfrm>
+            <a:off x="8102587" y="2373704"/>
+            <a:ext cx="274320" cy="274320"/>
+          </a:xfrm>
+          <a:prstGeom prst="ellipse">
+            <a:avLst/>
+          </a:prstGeom>
+        </p:spPr>
+        <p:style>
+          <a:lnRef idx="1">
+            <a:schemeClr val="accent1"/>
+          </a:lnRef>
+          <a:fillRef idx="3">
+            <a:schemeClr val="accent1"/>
+          </a:fillRef>
+          <a:effectRef idx="2">
+            <a:schemeClr val="accent1"/>
+          </a:effectRef>
+          <a:fontRef idx="minor">
+            <a:schemeClr val="lt1"/>
+          </a:fontRef>
+        </p:style>
+        <p:txBody>
+          <a:bodyPr rtlCol="0" anchor="ctr"/>
+          <a:lstStyle/>
+          <a:p>
+            <a:pPr algn="ctr"/>
+            <a:endParaRPr lang="en-US"/>
+          </a:p>
+        </p:txBody>
+      </p:sp>
+      <p:sp>
+        <p:nvSpPr>
+          <p:cNvPr id="84" name="Oval 83"/>
+          <p:cNvSpPr>
+            <a:spLocks noChangeAspect="1"/>
+          </p:cNvSpPr>
+          <p:nvPr/>
+        </p:nvSpPr>
+        <p:spPr>
+          <a:xfrm>
+            <a:off x="7092333" y="1271196"/>
+            <a:ext cx="274320" cy="274320"/>
+          </a:xfrm>
+          <a:prstGeom prst="ellipse">
+            <a:avLst/>
+          </a:prstGeom>
+        </p:spPr>
+        <p:style>
+          <a:lnRef idx="1">
+            <a:schemeClr val="accent1"/>
+          </a:lnRef>
+          <a:fillRef idx="3">
+            <a:schemeClr val="accent1"/>
+          </a:fillRef>
+          <a:effectRef idx="2">
+            <a:schemeClr val="accent1"/>
+          </a:effectRef>
+          <a:fontRef idx="minor">
+            <a:schemeClr val="lt1"/>
+          </a:fontRef>
+        </p:style>
+        <p:txBody>
+          <a:bodyPr rtlCol="0" anchor="ctr"/>
+          <a:lstStyle/>
+          <a:p>
+            <a:pPr algn="ctr"/>
+            <a:endParaRPr lang="en-US"/>
+          </a:p>
+        </p:txBody>
+      </p:sp>
+      <p:sp>
+        <p:nvSpPr>
+          <p:cNvPr id="85" name="Oval 84"/>
+          <p:cNvSpPr>
+            <a:spLocks noChangeAspect="1"/>
+          </p:cNvSpPr>
+          <p:nvPr/>
+        </p:nvSpPr>
+        <p:spPr>
+          <a:xfrm>
+            <a:off x="6316193" y="1271196"/>
+            <a:ext cx="274320" cy="274320"/>
+          </a:xfrm>
+          <a:prstGeom prst="ellipse">
+            <a:avLst/>
+          </a:prstGeom>
+        </p:spPr>
+        <p:style>
+          <a:lnRef idx="1">
+            <a:schemeClr val="accent1"/>
+          </a:lnRef>
+          <a:fillRef idx="3">
+            <a:schemeClr val="accent1"/>
+          </a:fillRef>
+          <a:effectRef idx="2">
+            <a:schemeClr val="accent1"/>
+          </a:effectRef>
+          <a:fontRef idx="minor">
+            <a:schemeClr val="lt1"/>
+          </a:fontRef>
+        </p:style>
+        <p:txBody>
+          <a:bodyPr rtlCol="0" anchor="ctr"/>
+          <a:lstStyle/>
+          <a:p>
+            <a:pPr algn="ctr"/>
+            <a:endParaRPr lang="en-US"/>
+          </a:p>
+        </p:txBody>
+      </p:sp>
+      <p:sp>
+        <p:nvSpPr>
+          <p:cNvPr id="86" name="Oval 85"/>
+          <p:cNvSpPr>
+            <a:spLocks noChangeAspect="1"/>
+          </p:cNvSpPr>
+          <p:nvPr/>
+        </p:nvSpPr>
+        <p:spPr>
+          <a:xfrm>
+            <a:off x="3041229" y="2377528"/>
+            <a:ext cx="274320" cy="274320"/>
+          </a:xfrm>
+          <a:prstGeom prst="ellipse">
+            <a:avLst/>
+          </a:prstGeom>
+        </p:spPr>
+        <p:style>
+          <a:lnRef idx="1">
+            <a:schemeClr val="accent1"/>
+          </a:lnRef>
+          <a:fillRef idx="3">
+            <a:schemeClr val="accent1"/>
+          </a:fillRef>
+          <a:effectRef idx="2">
+            <a:schemeClr val="accent1"/>
+          </a:effectRef>
+          <a:fontRef idx="minor">
+            <a:schemeClr val="lt1"/>
+          </a:fontRef>
+        </p:style>
+        <p:txBody>
+          <a:bodyPr rtlCol="0" anchor="ctr"/>
+          <a:lstStyle/>
+          <a:p>
+            <a:pPr algn="ctr"/>
+            <a:endParaRPr lang="en-US"/>
+          </a:p>
+        </p:txBody>
+      </p:sp>
+      <p:sp>
+        <p:nvSpPr>
+          <p:cNvPr id="87" name="TextBox 86"/>
+          <p:cNvSpPr txBox="1"/>
+          <p:nvPr/>
+        </p:nvSpPr>
+        <p:spPr>
+          <a:xfrm>
+            <a:off x="359596" y="813823"/>
+            <a:ext cx="418654" cy="646331"/>
+          </a:xfrm>
+          <a:prstGeom prst="rect">
+            <a:avLst/>
+          </a:prstGeom>
+          <a:noFill/>
+        </p:spPr>
+        <p:txBody>
+          <a:bodyPr wrap="none" rtlCol="0">
+            <a:spAutoFit/>
+          </a:bodyPr>
+          <a:lstStyle/>
+          <a:p>
+            <a:r>
+              <a:rPr lang="en-US" sz="3600" b="1" dirty="0" smtClean="0"/>
+              <a:t>0</a:t>
+            </a:r>
+            <a:endParaRPr lang="en-US" sz="3600" b="1" dirty="0"/>
+          </a:p>
+        </p:txBody>
+      </p:sp>
+      <p:sp>
+        <p:nvSpPr>
+          <p:cNvPr id="88" name="TextBox 87"/>
+          <p:cNvSpPr txBox="1"/>
+          <p:nvPr/>
+        </p:nvSpPr>
+        <p:spPr>
+          <a:xfrm>
+            <a:off x="1111051" y="813823"/>
+            <a:ext cx="418654" cy="646331"/>
+          </a:xfrm>
+          <a:prstGeom prst="rect">
+            <a:avLst/>
+          </a:prstGeom>
+          <a:noFill/>
+        </p:spPr>
+        <p:txBody>
+          <a:bodyPr wrap="none" rtlCol="0">
+            <a:spAutoFit/>
+          </a:bodyPr>
+          <a:lstStyle/>
+          <a:p>
+            <a:r>
+              <a:rPr lang="en-US" sz="3600" b="1" dirty="0"/>
+              <a:t>5</a:t>
+            </a:r>
+          </a:p>
+        </p:txBody>
+      </p:sp>
+      <p:sp>
+        <p:nvSpPr>
+          <p:cNvPr id="89" name="TextBox 88"/>
+          <p:cNvSpPr txBox="1"/>
+          <p:nvPr/>
+        </p:nvSpPr>
+        <p:spPr>
+          <a:xfrm>
+            <a:off x="1853223" y="859012"/>
+            <a:ext cx="652643" cy="646331"/>
+          </a:xfrm>
+          <a:prstGeom prst="rect">
+            <a:avLst/>
+          </a:prstGeom>
+          <a:noFill/>
+        </p:spPr>
+        <p:txBody>
+          <a:bodyPr wrap="none" rtlCol="0">
+            <a:spAutoFit/>
+          </a:bodyPr>
+          <a:lstStyle/>
+          <a:p>
+            <a:r>
+              <a:rPr lang="en-US" sz="3600" b="1" dirty="0" smtClean="0"/>
+              <a:t>10</a:t>
+            </a:r>
+            <a:endParaRPr lang="en-US" sz="3600" b="1" dirty="0"/>
+          </a:p>
+        </p:txBody>
+      </p:sp>
+      <p:sp>
+        <p:nvSpPr>
+          <p:cNvPr id="90" name="TextBox 89"/>
+          <p:cNvSpPr txBox="1"/>
+          <p:nvPr/>
+        </p:nvSpPr>
+        <p:spPr>
+          <a:xfrm>
+            <a:off x="2946424" y="2613059"/>
+            <a:ext cx="652643" cy="646331"/>
+          </a:xfrm>
+          <a:prstGeom prst="rect">
+            <a:avLst/>
+          </a:prstGeom>
+          <a:noFill/>
+        </p:spPr>
+        <p:txBody>
+          <a:bodyPr wrap="none" rtlCol="0">
+            <a:spAutoFit/>
+          </a:bodyPr>
+          <a:lstStyle/>
+          <a:p>
+            <a:r>
+              <a:rPr lang="en-US" sz="3600" b="1" dirty="0" smtClean="0"/>
+              <a:t>30</a:t>
+            </a:r>
+            <a:endParaRPr lang="en-US" sz="3600" b="1" dirty="0"/>
+          </a:p>
+        </p:txBody>
+      </p:sp>
+      <p:sp>
+        <p:nvSpPr>
+          <p:cNvPr id="91" name="TextBox 90"/>
+          <p:cNvSpPr txBox="1"/>
+          <p:nvPr/>
+        </p:nvSpPr>
+        <p:spPr>
+          <a:xfrm>
+            <a:off x="6973396" y="677365"/>
+            <a:ext cx="652643" cy="646331"/>
+          </a:xfrm>
+          <a:prstGeom prst="rect">
+            <a:avLst/>
+          </a:prstGeom>
+          <a:noFill/>
+        </p:spPr>
+        <p:txBody>
+          <a:bodyPr wrap="none" rtlCol="0">
+            <a:spAutoFit/>
+          </a:bodyPr>
+          <a:lstStyle/>
+          <a:p>
+            <a:r>
+              <a:rPr lang="en-US" sz="3600" b="1" dirty="0" smtClean="0"/>
+              <a:t>57</a:t>
+            </a:r>
+            <a:endParaRPr lang="en-US" sz="3600" b="1" dirty="0"/>
+          </a:p>
+        </p:txBody>
+      </p:sp>
+      <p:sp>
+        <p:nvSpPr>
+          <p:cNvPr id="92" name="TextBox 91"/>
+          <p:cNvSpPr txBox="1"/>
+          <p:nvPr/>
+        </p:nvSpPr>
+        <p:spPr>
+          <a:xfrm>
+            <a:off x="928114" y="2516598"/>
+            <a:ext cx="418654" cy="646331"/>
+          </a:xfrm>
+          <a:prstGeom prst="rect">
+            <a:avLst/>
+          </a:prstGeom>
+          <a:noFill/>
+        </p:spPr>
+        <p:txBody>
+          <a:bodyPr wrap="none" rtlCol="0">
+            <a:spAutoFit/>
+          </a:bodyPr>
+          <a:lstStyle/>
+          <a:p>
+            <a:r>
+              <a:rPr lang="en-US" sz="3600" b="1" dirty="0" smtClean="0"/>
+              <a:t>0</a:t>
+            </a:r>
+            <a:endParaRPr lang="en-US" sz="3600" b="1" dirty="0"/>
+          </a:p>
+        </p:txBody>
+      </p:sp>
+      <p:sp>
+        <p:nvSpPr>
+          <p:cNvPr id="93" name="TextBox 92"/>
+          <p:cNvSpPr txBox="1"/>
+          <p:nvPr/>
+        </p:nvSpPr>
+        <p:spPr>
+          <a:xfrm>
+            <a:off x="2622575" y="1540167"/>
+            <a:ext cx="652643" cy="646331"/>
+          </a:xfrm>
+          <a:prstGeom prst="rect">
+            <a:avLst/>
+          </a:prstGeom>
+          <a:noFill/>
+        </p:spPr>
+        <p:txBody>
+          <a:bodyPr wrap="none" rtlCol="0">
+            <a:spAutoFit/>
+          </a:bodyPr>
+          <a:lstStyle/>
+          <a:p>
+            <a:r>
+              <a:rPr lang="en-US" sz="3600" b="1" dirty="0" smtClean="0"/>
+              <a:t>20</a:t>
+            </a:r>
+            <a:endParaRPr lang="en-US" sz="3600" b="1" dirty="0"/>
+          </a:p>
+        </p:txBody>
+      </p:sp>
+      <p:sp>
+        <p:nvSpPr>
+          <p:cNvPr id="94" name="TextBox 93"/>
+          <p:cNvSpPr txBox="1"/>
+          <p:nvPr/>
+        </p:nvSpPr>
+        <p:spPr>
+          <a:xfrm>
+            <a:off x="3730336" y="2579492"/>
+            <a:ext cx="652643" cy="646331"/>
+          </a:xfrm>
+          <a:prstGeom prst="rect">
+            <a:avLst/>
+          </a:prstGeom>
+          <a:noFill/>
+        </p:spPr>
+        <p:txBody>
+          <a:bodyPr wrap="none" rtlCol="0">
+            <a:spAutoFit/>
+          </a:bodyPr>
+          <a:lstStyle/>
+          <a:p>
+            <a:r>
+              <a:rPr lang="en-US" sz="3600" b="1" dirty="0" smtClean="0"/>
+              <a:t>34</a:t>
+            </a:r>
+            <a:endParaRPr lang="en-US" sz="3600" b="1" dirty="0"/>
+          </a:p>
+        </p:txBody>
+      </p:sp>
+      <p:sp>
+        <p:nvSpPr>
+          <p:cNvPr id="95" name="TextBox 94"/>
+          <p:cNvSpPr txBox="1"/>
+          <p:nvPr/>
+        </p:nvSpPr>
+        <p:spPr>
+          <a:xfrm>
+            <a:off x="4458717" y="2579492"/>
+            <a:ext cx="652643" cy="646331"/>
+          </a:xfrm>
+          <a:prstGeom prst="rect">
+            <a:avLst/>
+          </a:prstGeom>
+          <a:noFill/>
+        </p:spPr>
+        <p:txBody>
+          <a:bodyPr wrap="none" rtlCol="0">
+            <a:spAutoFit/>
+          </a:bodyPr>
+          <a:lstStyle/>
+          <a:p>
+            <a:r>
+              <a:rPr lang="en-US" sz="3600" b="1" dirty="0" smtClean="0"/>
+              <a:t>50</a:t>
+            </a:r>
+            <a:endParaRPr lang="en-US" sz="3600" b="1" dirty="0"/>
+          </a:p>
+        </p:txBody>
+      </p:sp>
+      <p:sp>
+        <p:nvSpPr>
+          <p:cNvPr id="96" name="TextBox 95"/>
+          <p:cNvSpPr txBox="1"/>
+          <p:nvPr/>
+        </p:nvSpPr>
+        <p:spPr>
+          <a:xfrm>
+            <a:off x="4969703" y="1595064"/>
+            <a:ext cx="652643" cy="646331"/>
+          </a:xfrm>
+          <a:prstGeom prst="rect">
+            <a:avLst/>
+          </a:prstGeom>
+          <a:noFill/>
+        </p:spPr>
+        <p:txBody>
+          <a:bodyPr wrap="none" rtlCol="0">
+            <a:spAutoFit/>
+          </a:bodyPr>
+          <a:lstStyle/>
+          <a:p>
+            <a:r>
+              <a:rPr lang="en-US" sz="3600" b="1" dirty="0" smtClean="0"/>
+              <a:t>50</a:t>
+            </a:r>
+            <a:endParaRPr lang="en-US" sz="3600" b="1" dirty="0"/>
+          </a:p>
+        </p:txBody>
+      </p:sp>
+      <p:sp>
+        <p:nvSpPr>
+          <p:cNvPr id="97" name="TextBox 96"/>
+          <p:cNvSpPr txBox="1"/>
+          <p:nvPr/>
+        </p:nvSpPr>
+        <p:spPr>
+          <a:xfrm>
+            <a:off x="5194965" y="2579492"/>
+            <a:ext cx="652643" cy="646331"/>
+          </a:xfrm>
+          <a:prstGeom prst="rect">
+            <a:avLst/>
+          </a:prstGeom>
+          <a:noFill/>
+        </p:spPr>
+        <p:txBody>
+          <a:bodyPr wrap="none" rtlCol="0">
+            <a:spAutoFit/>
+          </a:bodyPr>
+          <a:lstStyle/>
+          <a:p>
+            <a:r>
+              <a:rPr lang="en-US" sz="3600" b="1" dirty="0" smtClean="0"/>
+              <a:t>51</a:t>
+            </a:r>
+            <a:endParaRPr lang="en-US" sz="3600" b="1" dirty="0"/>
+          </a:p>
+        </p:txBody>
+      </p:sp>
+      <p:sp>
+        <p:nvSpPr>
+          <p:cNvPr id="98" name="TextBox 97"/>
+          <p:cNvSpPr txBox="1"/>
+          <p:nvPr/>
+        </p:nvSpPr>
+        <p:spPr>
+          <a:xfrm>
+            <a:off x="6106866" y="2613059"/>
+            <a:ext cx="652643" cy="646331"/>
+          </a:xfrm>
+          <a:prstGeom prst="rect">
+            <a:avLst/>
+          </a:prstGeom>
+          <a:noFill/>
+        </p:spPr>
+        <p:txBody>
+          <a:bodyPr wrap="none" rtlCol="0">
+            <a:spAutoFit/>
+          </a:bodyPr>
+          <a:lstStyle/>
+          <a:p>
+            <a:r>
+              <a:rPr lang="en-US" sz="3600" b="1" dirty="0" smtClean="0"/>
+              <a:t>52</a:t>
+            </a:r>
+            <a:endParaRPr lang="en-US" sz="3600" b="1" dirty="0"/>
+          </a:p>
+        </p:txBody>
+      </p:sp>
+      <p:sp>
+        <p:nvSpPr>
+          <p:cNvPr id="99" name="TextBox 98"/>
+          <p:cNvSpPr txBox="1"/>
+          <p:nvPr/>
+        </p:nvSpPr>
+        <p:spPr>
+          <a:xfrm>
+            <a:off x="6171859" y="697028"/>
+            <a:ext cx="652643" cy="646331"/>
+          </a:xfrm>
+          <a:prstGeom prst="rect">
+            <a:avLst/>
+          </a:prstGeom>
+          <a:noFill/>
+        </p:spPr>
+        <p:txBody>
+          <a:bodyPr wrap="none" rtlCol="0">
+            <a:spAutoFit/>
+          </a:bodyPr>
+          <a:lstStyle/>
+          <a:p>
+            <a:r>
+              <a:rPr lang="en-US" sz="3600" b="1" dirty="0" smtClean="0"/>
+              <a:t>55</a:t>
+            </a:r>
+            <a:endParaRPr lang="en-US" sz="3600" b="1" dirty="0"/>
+          </a:p>
+        </p:txBody>
+      </p:sp>
+      <p:sp>
+        <p:nvSpPr>
+          <p:cNvPr id="100" name="Oval 99"/>
+          <p:cNvSpPr>
+            <a:spLocks noChangeAspect="1"/>
+          </p:cNvSpPr>
+          <p:nvPr/>
+        </p:nvSpPr>
+        <p:spPr>
+          <a:xfrm>
+            <a:off x="7092333" y="2407844"/>
+            <a:ext cx="274320" cy="274320"/>
+          </a:xfrm>
+          <a:prstGeom prst="ellipse">
+            <a:avLst/>
+          </a:prstGeom>
+        </p:spPr>
+        <p:style>
+          <a:lnRef idx="1">
+            <a:schemeClr val="accent1"/>
+          </a:lnRef>
+          <a:fillRef idx="3">
+            <a:schemeClr val="accent1"/>
+          </a:fillRef>
+          <a:effectRef idx="2">
+            <a:schemeClr val="accent1"/>
+          </a:effectRef>
+          <a:fontRef idx="minor">
+            <a:schemeClr val="lt1"/>
+          </a:fontRef>
+        </p:style>
+        <p:txBody>
+          <a:bodyPr rtlCol="0" anchor="ctr"/>
+          <a:lstStyle/>
+          <a:p>
+            <a:pPr algn="ctr"/>
+            <a:endParaRPr lang="en-US"/>
+          </a:p>
+        </p:txBody>
+      </p:sp>
+      <p:sp>
+        <p:nvSpPr>
+          <p:cNvPr id="101" name="TextBox 100"/>
+          <p:cNvSpPr txBox="1"/>
+          <p:nvPr/>
+        </p:nvSpPr>
+        <p:spPr>
+          <a:xfrm>
+            <a:off x="7126044" y="1653268"/>
+            <a:ext cx="652643" cy="646331"/>
+          </a:xfrm>
+          <a:prstGeom prst="rect">
+            <a:avLst/>
+          </a:prstGeom>
+          <a:noFill/>
+        </p:spPr>
+        <p:txBody>
+          <a:bodyPr wrap="none" rtlCol="0">
+            <a:spAutoFit/>
+          </a:bodyPr>
+          <a:lstStyle/>
+          <a:p>
+            <a:r>
+              <a:rPr lang="en-US" sz="3600" b="1" dirty="0" smtClean="0"/>
+              <a:t>57</a:t>
+            </a:r>
+            <a:endParaRPr lang="en-US" sz="3600" b="1" dirty="0"/>
+          </a:p>
+        </p:txBody>
+      </p:sp>
+      <p:sp>
+        <p:nvSpPr>
+          <p:cNvPr id="102" name="TextBox 101"/>
+          <p:cNvSpPr txBox="1"/>
+          <p:nvPr/>
+        </p:nvSpPr>
+        <p:spPr>
+          <a:xfrm>
+            <a:off x="7089530" y="2613059"/>
+            <a:ext cx="652643" cy="646331"/>
+          </a:xfrm>
+          <a:prstGeom prst="rect">
+            <a:avLst/>
+          </a:prstGeom>
+          <a:noFill/>
+        </p:spPr>
+        <p:txBody>
+          <a:bodyPr wrap="none" rtlCol="0">
+            <a:spAutoFit/>
+          </a:bodyPr>
+          <a:lstStyle/>
+          <a:p>
+            <a:r>
+              <a:rPr lang="en-US" sz="3600" b="1" dirty="0" smtClean="0"/>
+              <a:t>80</a:t>
+            </a:r>
+            <a:endParaRPr lang="en-US" sz="3600" b="1" dirty="0"/>
+          </a:p>
+        </p:txBody>
+      </p:sp>
+      <p:sp>
+        <p:nvSpPr>
+          <p:cNvPr id="103" name="TextBox 102"/>
+          <p:cNvSpPr txBox="1"/>
+          <p:nvPr/>
+        </p:nvSpPr>
+        <p:spPr>
+          <a:xfrm>
+            <a:off x="8136118" y="2579492"/>
+            <a:ext cx="652643" cy="646331"/>
+          </a:xfrm>
+          <a:prstGeom prst="rect">
+            <a:avLst/>
+          </a:prstGeom>
+          <a:noFill/>
+        </p:spPr>
+        <p:txBody>
+          <a:bodyPr wrap="none" rtlCol="0">
+            <a:spAutoFit/>
+          </a:bodyPr>
+          <a:lstStyle/>
+          <a:p>
+            <a:r>
+              <a:rPr lang="en-US" sz="3600" b="1" dirty="0" smtClean="0"/>
+              <a:t>81</a:t>
+            </a:r>
+            <a:endParaRPr lang="en-US" sz="3600" b="1" dirty="0"/>
+          </a:p>
+        </p:txBody>
+      </p:sp>
+      <p:sp>
+        <p:nvSpPr>
+          <p:cNvPr id="104" name="TextBox 103"/>
+          <p:cNvSpPr txBox="1"/>
+          <p:nvPr/>
+        </p:nvSpPr>
+        <p:spPr>
+          <a:xfrm>
+            <a:off x="8449074" y="1352413"/>
+            <a:ext cx="464415" cy="646331"/>
+          </a:xfrm>
+          <a:prstGeom prst="rect">
+            <a:avLst/>
+          </a:prstGeom>
+          <a:noFill/>
+        </p:spPr>
+        <p:txBody>
+          <a:bodyPr wrap="none" rtlCol="0">
+            <a:spAutoFit/>
+          </a:bodyPr>
+          <a:lstStyle/>
+          <a:p>
+            <a:r>
+              <a:rPr lang="en-US" sz="3600" b="1" dirty="0" smtClean="0"/>
+              <a:t>A</a:t>
+            </a:r>
+            <a:endParaRPr lang="en-US" sz="3600" b="1" dirty="0"/>
+          </a:p>
+        </p:txBody>
+      </p:sp>
+      <p:sp>
+        <p:nvSpPr>
+          <p:cNvPr id="105" name="TextBox 104"/>
+          <p:cNvSpPr txBox="1"/>
+          <p:nvPr/>
+        </p:nvSpPr>
+        <p:spPr>
+          <a:xfrm>
+            <a:off x="8514242" y="1826973"/>
+            <a:ext cx="443451" cy="646331"/>
+          </a:xfrm>
+          <a:prstGeom prst="rect">
+            <a:avLst/>
+          </a:prstGeom>
+          <a:noFill/>
+        </p:spPr>
+        <p:txBody>
+          <a:bodyPr wrap="none" rtlCol="0">
+            <a:spAutoFit/>
+          </a:bodyPr>
+          <a:lstStyle/>
+          <a:p>
+            <a:r>
+              <a:rPr lang="en-US" sz="3600" b="1" dirty="0"/>
+              <a:t>B</a:t>
+            </a:r>
+          </a:p>
+        </p:txBody>
+      </p:sp>
+      <p:cxnSp>
+        <p:nvCxnSpPr>
+          <p:cNvPr id="25" name="Straight Arrow Connector 24"/>
+          <p:cNvCxnSpPr>
+            <a:stCxn id="88" idx="0"/>
+            <a:endCxn id="89" idx="0"/>
+          </p:cNvCxnSpPr>
+          <p:nvPr/>
+        </p:nvCxnSpPr>
+        <p:spPr>
+          <a:xfrm>
+            <a:off x="1320378" y="813823"/>
+            <a:ext cx="859167" cy="45189"/>
+          </a:xfrm>
+          <a:prstGeom prst="straightConnector1">
+            <a:avLst/>
+          </a:prstGeom>
+          <a:ln w="76200" cmpd="sng">
+            <a:solidFill>
+              <a:srgbClr val="800000"/>
+            </a:solidFill>
+            <a:tailEnd type="arrow"/>
+          </a:ln>
+        </p:spPr>
+        <p:style>
+          <a:lnRef idx="2">
+            <a:schemeClr val="accent1"/>
+          </a:lnRef>
+          <a:fillRef idx="0">
+            <a:schemeClr val="accent1"/>
+          </a:fillRef>
+          <a:effectRef idx="1">
+            <a:schemeClr val="accent1"/>
+          </a:effectRef>
+          <a:fontRef idx="minor">
+            <a:schemeClr val="tx1"/>
+          </a:fontRef>
+        </p:style>
+      </p:cxnSp>
+      <p:sp>
+        <p:nvSpPr>
+          <p:cNvPr id="29" name="TextBox 28"/>
+          <p:cNvSpPr txBox="1"/>
+          <p:nvPr/>
+        </p:nvSpPr>
+        <p:spPr>
+          <a:xfrm>
+            <a:off x="1041063" y="112252"/>
+            <a:ext cx="3318487" cy="523220"/>
+          </a:xfrm>
+          <a:prstGeom prst="rect">
+            <a:avLst/>
+          </a:prstGeom>
+          <a:solidFill>
+            <a:srgbClr val="FFFF00"/>
+          </a:solidFill>
+        </p:spPr>
+        <p:txBody>
+          <a:bodyPr wrap="none" rtlCol="0">
+            <a:spAutoFit/>
+          </a:bodyPr>
+          <a:lstStyle/>
+          <a:p>
+            <a:r>
+              <a:rPr lang="en-US" sz="2800" b="1" dirty="0" smtClean="0"/>
+              <a:t>Timestamp increases</a:t>
+            </a:r>
+            <a:endParaRPr lang="en-US" sz="2800" b="1" dirty="0"/>
+          </a:p>
+        </p:txBody>
+      </p:sp>
+    </p:spTree>
+    <p:extLst>
+      <p:ext uri="{BB962C8B-B14F-4D97-AF65-F5344CB8AC3E}">
+        <p14:creationId xmlns:p14="http://schemas.microsoft.com/office/powerpoint/2010/main" val="2128552883"/>
+      </p:ext>
+    </p:extLst>
+  </p:cSld>
+  <p:clrMapOvr>
+    <a:masterClrMapping/>
+  </p:clrMapOvr>
+  <p:timing>
+    <p:tnLst>
+      <p:par>
+        <p:cTn xmlns:p14="http://schemas.microsoft.com/office/powerpoint/2010/main" id="1" dur="indefinite" restart="never" nodeType="tmRoot"/>
+      </p:par>
+    </p:tnLst>
+  </p:timing>
+</p:sld>
+</file>
+
+<file path=ppt/slides/slide15.xml><?xml version="1.0" encoding="utf-8"?>
+<p:sld xmlns:a="http://schemas.openxmlformats.org/drawingml/2006/main" xmlns:r="http://schemas.openxmlformats.org/officeDocument/2006/relationships" xmlns:p="http://schemas.openxmlformats.org/presentationml/2006/main">
+  <p:cSld>
+    <p:spTree>
+      <p:nvGrpSpPr>
+        <p:cNvPr id="1" name=""/>
+        <p:cNvGrpSpPr/>
+        <p:nvPr/>
+      </p:nvGrpSpPr>
+      <p:grpSpPr>
+        <a:xfrm>
+          <a:off x="0" y="0"/>
+          <a:ext cx="0" cy="0"/>
+          <a:chOff x="0" y="0"/>
+          <a:chExt cx="0" cy="0"/>
+        </a:xfrm>
+      </p:grpSpPr>
+      <p:sp>
+        <p:nvSpPr>
+          <p:cNvPr id="10" name="TextBox 9"/>
+          <p:cNvSpPr txBox="1"/>
+          <p:nvPr/>
+        </p:nvSpPr>
+        <p:spPr>
+          <a:xfrm>
+            <a:off x="10764169" y="1140661"/>
+            <a:ext cx="184666" cy="369332"/>
+          </a:xfrm>
+          <a:prstGeom prst="rect">
+            <a:avLst/>
+          </a:prstGeom>
+          <a:noFill/>
+          <a:ln>
+            <a:solidFill>
+              <a:schemeClr val="tx1"/>
+            </a:solidFill>
+            <a:prstDash val="dash"/>
+          </a:ln>
+        </p:spPr>
+        <p:txBody>
+          <a:bodyPr wrap="none" rtlCol="0">
+            <a:spAutoFit/>
+          </a:bodyPr>
+          <a:lstStyle/>
+          <a:p>
+            <a:endParaRPr lang="en-US" dirty="0"/>
+          </a:p>
+        </p:txBody>
+      </p:sp>
+      <p:cxnSp>
+        <p:nvCxnSpPr>
+          <p:cNvPr id="106" name="Straight Arrow Connector 105"/>
+          <p:cNvCxnSpPr/>
+          <p:nvPr/>
+        </p:nvCxnSpPr>
+        <p:spPr>
+          <a:xfrm flipV="1">
+            <a:off x="426797" y="2840450"/>
+            <a:ext cx="8922606" cy="49548"/>
+          </a:xfrm>
+          <a:prstGeom prst="straightConnector1">
+            <a:avLst/>
+          </a:prstGeom>
+          <a:ln w="76200" cmpd="sng">
+            <a:tailEnd type="arrow"/>
+          </a:ln>
+        </p:spPr>
+        <p:style>
+          <a:lnRef idx="2">
+            <a:schemeClr val="accent1"/>
+          </a:lnRef>
+          <a:fillRef idx="0">
+            <a:schemeClr val="accent1"/>
+          </a:fillRef>
+          <a:effectRef idx="1">
+            <a:schemeClr val="accent1"/>
+          </a:effectRef>
+          <a:fontRef idx="minor">
+            <a:schemeClr val="tx1"/>
+          </a:fontRef>
+        </p:style>
+      </p:cxnSp>
+      <p:cxnSp>
+        <p:nvCxnSpPr>
+          <p:cNvPr id="107" name="Straight Arrow Connector 106"/>
+          <p:cNvCxnSpPr/>
+          <p:nvPr/>
+        </p:nvCxnSpPr>
+        <p:spPr>
+          <a:xfrm flipV="1">
+            <a:off x="205403" y="1772907"/>
+            <a:ext cx="9144000" cy="49548"/>
+          </a:xfrm>
+          <a:prstGeom prst="straightConnector1">
+            <a:avLst/>
+          </a:prstGeom>
+          <a:ln w="76200" cmpd="sng">
+            <a:tailEnd type="arrow"/>
+          </a:ln>
+        </p:spPr>
+        <p:style>
+          <a:lnRef idx="2">
+            <a:schemeClr val="accent1"/>
+          </a:lnRef>
+          <a:fillRef idx="0">
+            <a:schemeClr val="accent1"/>
+          </a:fillRef>
+          <a:effectRef idx="1">
+            <a:schemeClr val="accent1"/>
+          </a:effectRef>
+          <a:fontRef idx="minor">
+            <a:schemeClr val="tx1"/>
+          </a:fontRef>
+        </p:style>
+      </p:cxnSp>
+      <p:cxnSp>
+        <p:nvCxnSpPr>
+          <p:cNvPr id="108" name="Straight Arrow Connector 107"/>
+          <p:cNvCxnSpPr>
+            <a:endCxn id="122" idx="1"/>
+          </p:cNvCxnSpPr>
+          <p:nvPr/>
+        </p:nvCxnSpPr>
+        <p:spPr>
+          <a:xfrm>
+            <a:off x="2177065" y="1822455"/>
+            <a:ext cx="1039225" cy="959797"/>
+          </a:xfrm>
+          <a:prstGeom prst="straightConnector1">
+            <a:avLst/>
+          </a:prstGeom>
+          <a:ln w="76200" cmpd="sng">
+            <a:solidFill>
+              <a:srgbClr val="FF0000"/>
+            </a:solidFill>
+            <a:prstDash val="solid"/>
+            <a:tailEnd type="arrow"/>
+          </a:ln>
+        </p:spPr>
+        <p:style>
+          <a:lnRef idx="2">
+            <a:schemeClr val="accent1"/>
+          </a:lnRef>
+          <a:fillRef idx="0">
+            <a:schemeClr val="accent1"/>
+          </a:fillRef>
+          <a:effectRef idx="1">
+            <a:schemeClr val="accent1"/>
+          </a:effectRef>
+          <a:fontRef idx="minor">
+            <a:schemeClr val="tx1"/>
+          </a:fontRef>
+        </p:style>
+      </p:cxnSp>
+      <p:cxnSp>
+        <p:nvCxnSpPr>
+          <p:cNvPr id="109" name="Straight Arrow Connector 108"/>
+          <p:cNvCxnSpPr>
+            <a:stCxn id="116" idx="6"/>
+            <a:endCxn id="121" idx="3"/>
+          </p:cNvCxnSpPr>
+          <p:nvPr/>
+        </p:nvCxnSpPr>
+        <p:spPr>
+          <a:xfrm flipV="1">
+            <a:off x="4942126" y="1869894"/>
+            <a:ext cx="1549128" cy="1030294"/>
+          </a:xfrm>
+          <a:prstGeom prst="straightConnector1">
+            <a:avLst/>
+          </a:prstGeom>
+          <a:ln w="76200" cmpd="sng">
+            <a:solidFill>
+              <a:srgbClr val="FF0000"/>
+            </a:solidFill>
+            <a:prstDash val="solid"/>
+            <a:tailEnd type="arrow"/>
+          </a:ln>
+        </p:spPr>
+        <p:style>
+          <a:lnRef idx="2">
+            <a:schemeClr val="accent1"/>
+          </a:lnRef>
+          <a:fillRef idx="0">
+            <a:schemeClr val="accent1"/>
+          </a:fillRef>
+          <a:effectRef idx="1">
+            <a:schemeClr val="accent1"/>
+          </a:effectRef>
+          <a:fontRef idx="minor">
+            <a:schemeClr val="tx1"/>
+          </a:fontRef>
+        </p:style>
+      </p:cxnSp>
+      <p:cxnSp>
+        <p:nvCxnSpPr>
+          <p:cNvPr id="110" name="Straight Arrow Connector 109"/>
+          <p:cNvCxnSpPr>
+            <a:stCxn id="120" idx="5"/>
+            <a:endCxn id="119" idx="0"/>
+          </p:cNvCxnSpPr>
+          <p:nvPr/>
+        </p:nvCxnSpPr>
+        <p:spPr>
+          <a:xfrm>
+            <a:off x="7461368" y="1869894"/>
+            <a:ext cx="913267" cy="868361"/>
+          </a:xfrm>
+          <a:prstGeom prst="straightConnector1">
+            <a:avLst/>
+          </a:prstGeom>
+          <a:ln w="76200" cmpd="sng">
+            <a:solidFill>
+              <a:srgbClr val="FF0000"/>
+            </a:solidFill>
+            <a:prstDash val="solid"/>
+            <a:tailEnd type="arrow"/>
+          </a:ln>
+        </p:spPr>
+        <p:style>
+          <a:lnRef idx="2">
+            <a:schemeClr val="accent1"/>
+          </a:lnRef>
+          <a:fillRef idx="0">
+            <a:schemeClr val="accent1"/>
+          </a:fillRef>
+          <a:effectRef idx="1">
+            <a:schemeClr val="accent1"/>
+          </a:effectRef>
+          <a:fontRef idx="minor">
+            <a:schemeClr val="tx1"/>
+          </a:fontRef>
+        </p:style>
+      </p:cxnSp>
+      <p:sp>
+        <p:nvSpPr>
+          <p:cNvPr id="111" name="Oval 110"/>
+          <p:cNvSpPr>
+            <a:spLocks noChangeAspect="1"/>
+          </p:cNvSpPr>
+          <p:nvPr/>
+        </p:nvSpPr>
+        <p:spPr>
+          <a:xfrm>
+            <a:off x="619640" y="1685295"/>
+            <a:ext cx="274320" cy="274320"/>
+          </a:xfrm>
+          <a:prstGeom prst="ellipse">
+            <a:avLst/>
+          </a:prstGeom>
+        </p:spPr>
+        <p:style>
+          <a:lnRef idx="1">
+            <a:schemeClr val="accent1"/>
+          </a:lnRef>
+          <a:fillRef idx="3">
+            <a:schemeClr val="accent1"/>
+          </a:fillRef>
+          <a:effectRef idx="2">
+            <a:schemeClr val="accent1"/>
+          </a:effectRef>
+          <a:fontRef idx="minor">
+            <a:schemeClr val="lt1"/>
+          </a:fontRef>
+        </p:style>
+        <p:txBody>
+          <a:bodyPr rtlCol="0" anchor="ctr"/>
+          <a:lstStyle/>
+          <a:p>
+            <a:pPr algn="ctr"/>
+            <a:endParaRPr lang="en-US" dirty="0"/>
+          </a:p>
+        </p:txBody>
+      </p:sp>
+      <p:sp>
+        <p:nvSpPr>
+          <p:cNvPr id="112" name="Oval 111"/>
+          <p:cNvSpPr>
+            <a:spLocks noChangeAspect="1"/>
+          </p:cNvSpPr>
+          <p:nvPr/>
+        </p:nvSpPr>
+        <p:spPr>
+          <a:xfrm>
+            <a:off x="1390273" y="1688247"/>
+            <a:ext cx="274320" cy="274320"/>
+          </a:xfrm>
+          <a:prstGeom prst="ellipse">
+            <a:avLst/>
+          </a:prstGeom>
+        </p:spPr>
+        <p:style>
+          <a:lnRef idx="1">
+            <a:schemeClr val="accent1"/>
+          </a:lnRef>
+          <a:fillRef idx="3">
+            <a:schemeClr val="accent1"/>
+          </a:fillRef>
+          <a:effectRef idx="2">
+            <a:schemeClr val="accent1"/>
+          </a:effectRef>
+          <a:fontRef idx="minor">
+            <a:schemeClr val="lt1"/>
+          </a:fontRef>
+        </p:style>
+        <p:txBody>
+          <a:bodyPr rtlCol="0" anchor="ctr"/>
+          <a:lstStyle/>
+          <a:p>
+            <a:pPr algn="ctr"/>
+            <a:endParaRPr lang="en-US"/>
+          </a:p>
+        </p:txBody>
+      </p:sp>
+      <p:sp>
+        <p:nvSpPr>
+          <p:cNvPr id="113" name="Oval 112"/>
+          <p:cNvSpPr>
+            <a:spLocks noChangeAspect="1"/>
+          </p:cNvSpPr>
+          <p:nvPr/>
+        </p:nvSpPr>
+        <p:spPr>
+          <a:xfrm>
+            <a:off x="2132445" y="1707910"/>
+            <a:ext cx="274320" cy="274320"/>
+          </a:xfrm>
+          <a:prstGeom prst="ellipse">
+            <a:avLst/>
+          </a:prstGeom>
+        </p:spPr>
+        <p:style>
+          <a:lnRef idx="1">
+            <a:schemeClr val="accent1"/>
+          </a:lnRef>
+          <a:fillRef idx="3">
+            <a:schemeClr val="accent1"/>
+          </a:fillRef>
+          <a:effectRef idx="2">
+            <a:schemeClr val="accent1"/>
+          </a:effectRef>
+          <a:fontRef idx="minor">
+            <a:schemeClr val="lt1"/>
+          </a:fontRef>
+        </p:style>
+        <p:txBody>
+          <a:bodyPr rtlCol="0" anchor="ctr"/>
+          <a:lstStyle/>
+          <a:p>
+            <a:pPr algn="ctr"/>
+            <a:endParaRPr lang="en-US"/>
+          </a:p>
+        </p:txBody>
+      </p:sp>
+      <p:sp>
+        <p:nvSpPr>
+          <p:cNvPr id="114" name="Oval 113"/>
+          <p:cNvSpPr>
+            <a:spLocks noChangeAspect="1"/>
+          </p:cNvSpPr>
+          <p:nvPr/>
+        </p:nvSpPr>
+        <p:spPr>
+          <a:xfrm>
+            <a:off x="1115953" y="2752838"/>
+            <a:ext cx="274320" cy="274320"/>
+          </a:xfrm>
+          <a:prstGeom prst="ellipse">
+            <a:avLst/>
+          </a:prstGeom>
+        </p:spPr>
+        <p:style>
+          <a:lnRef idx="1">
+            <a:schemeClr val="accent1"/>
+          </a:lnRef>
+          <a:fillRef idx="3">
+            <a:schemeClr val="accent1"/>
+          </a:fillRef>
+          <a:effectRef idx="2">
+            <a:schemeClr val="accent1"/>
+          </a:effectRef>
+          <a:fontRef idx="minor">
+            <a:schemeClr val="lt1"/>
+          </a:fontRef>
+        </p:style>
+        <p:txBody>
+          <a:bodyPr rtlCol="0" anchor="ctr"/>
+          <a:lstStyle/>
+          <a:p>
+            <a:pPr algn="ctr"/>
+            <a:endParaRPr lang="en-US"/>
+          </a:p>
+        </p:txBody>
+      </p:sp>
+      <p:sp>
+        <p:nvSpPr>
+          <p:cNvPr id="115" name="Oval 114"/>
+          <p:cNvSpPr>
+            <a:spLocks noChangeAspect="1"/>
+          </p:cNvSpPr>
+          <p:nvPr/>
+        </p:nvSpPr>
+        <p:spPr>
+          <a:xfrm>
+            <a:off x="3865224" y="2753794"/>
+            <a:ext cx="274320" cy="274320"/>
+          </a:xfrm>
+          <a:prstGeom prst="ellipse">
+            <a:avLst/>
+          </a:prstGeom>
+        </p:spPr>
+        <p:style>
+          <a:lnRef idx="1">
+            <a:schemeClr val="accent1"/>
+          </a:lnRef>
+          <a:fillRef idx="3">
+            <a:schemeClr val="accent1"/>
+          </a:fillRef>
+          <a:effectRef idx="2">
+            <a:schemeClr val="accent1"/>
+          </a:effectRef>
+          <a:fontRef idx="minor">
+            <a:schemeClr val="lt1"/>
+          </a:fontRef>
+        </p:style>
+        <p:txBody>
+          <a:bodyPr rtlCol="0" anchor="ctr"/>
+          <a:lstStyle/>
+          <a:p>
+            <a:pPr algn="ctr"/>
+            <a:endParaRPr lang="en-US"/>
+          </a:p>
+        </p:txBody>
+      </p:sp>
+      <p:sp>
+        <p:nvSpPr>
+          <p:cNvPr id="116" name="Oval 115"/>
+          <p:cNvSpPr>
+            <a:spLocks noChangeAspect="1"/>
+          </p:cNvSpPr>
+          <p:nvPr/>
+        </p:nvSpPr>
+        <p:spPr>
+          <a:xfrm>
+            <a:off x="4667806" y="2763028"/>
+            <a:ext cx="274320" cy="274320"/>
+          </a:xfrm>
+          <a:prstGeom prst="ellipse">
+            <a:avLst/>
+          </a:prstGeom>
+        </p:spPr>
+        <p:style>
+          <a:lnRef idx="1">
+            <a:schemeClr val="accent1"/>
+          </a:lnRef>
+          <a:fillRef idx="3">
+            <a:schemeClr val="accent1"/>
+          </a:fillRef>
+          <a:effectRef idx="2">
+            <a:schemeClr val="accent1"/>
+          </a:effectRef>
+          <a:fontRef idx="minor">
+            <a:schemeClr val="lt1"/>
+          </a:fontRef>
+        </p:style>
+        <p:txBody>
+          <a:bodyPr rtlCol="0" anchor="ctr"/>
+          <a:lstStyle/>
+          <a:p>
+            <a:pPr algn="ctr"/>
+            <a:endParaRPr lang="en-US"/>
+          </a:p>
+        </p:txBody>
+      </p:sp>
+      <p:sp>
+        <p:nvSpPr>
+          <p:cNvPr id="117" name="Oval 116"/>
+          <p:cNvSpPr>
+            <a:spLocks noChangeAspect="1"/>
+          </p:cNvSpPr>
+          <p:nvPr/>
+        </p:nvSpPr>
+        <p:spPr>
+          <a:xfrm>
+            <a:off x="5430913" y="2703290"/>
+            <a:ext cx="274320" cy="274320"/>
+          </a:xfrm>
+          <a:prstGeom prst="ellipse">
+            <a:avLst/>
+          </a:prstGeom>
+        </p:spPr>
+        <p:style>
+          <a:lnRef idx="1">
+            <a:schemeClr val="accent1"/>
+          </a:lnRef>
+          <a:fillRef idx="3">
+            <a:schemeClr val="accent1"/>
+          </a:fillRef>
+          <a:effectRef idx="2">
+            <a:schemeClr val="accent1"/>
+          </a:effectRef>
+          <a:fontRef idx="minor">
+            <a:schemeClr val="lt1"/>
+          </a:fontRef>
+        </p:style>
+        <p:txBody>
+          <a:bodyPr rtlCol="0" anchor="ctr"/>
+          <a:lstStyle/>
+          <a:p>
+            <a:pPr algn="ctr"/>
+            <a:endParaRPr lang="en-US"/>
+          </a:p>
+        </p:txBody>
+      </p:sp>
+      <p:sp>
+        <p:nvSpPr>
+          <p:cNvPr id="118" name="Oval 117"/>
+          <p:cNvSpPr>
+            <a:spLocks noChangeAspect="1"/>
+          </p:cNvSpPr>
+          <p:nvPr/>
+        </p:nvSpPr>
+        <p:spPr>
+          <a:xfrm>
+            <a:off x="6283072" y="2738625"/>
+            <a:ext cx="274320" cy="274320"/>
+          </a:xfrm>
+          <a:prstGeom prst="ellipse">
+            <a:avLst/>
+          </a:prstGeom>
+        </p:spPr>
+        <p:style>
+          <a:lnRef idx="1">
+            <a:schemeClr val="accent1"/>
+          </a:lnRef>
+          <a:fillRef idx="3">
+            <a:schemeClr val="accent1"/>
+          </a:fillRef>
+          <a:effectRef idx="2">
+            <a:schemeClr val="accent1"/>
+          </a:effectRef>
+          <a:fontRef idx="minor">
+            <a:schemeClr val="lt1"/>
+          </a:fontRef>
+        </p:style>
+        <p:txBody>
+          <a:bodyPr rtlCol="0" anchor="ctr"/>
+          <a:lstStyle/>
+          <a:p>
+            <a:pPr algn="ctr"/>
+            <a:endParaRPr lang="en-US"/>
+          </a:p>
+        </p:txBody>
+      </p:sp>
+      <p:sp>
+        <p:nvSpPr>
+          <p:cNvPr id="119" name="Oval 118"/>
+          <p:cNvSpPr>
+            <a:spLocks noChangeAspect="1"/>
+          </p:cNvSpPr>
+          <p:nvPr/>
+        </p:nvSpPr>
+        <p:spPr>
+          <a:xfrm>
+            <a:off x="8237475" y="2738255"/>
+            <a:ext cx="274320" cy="274320"/>
+          </a:xfrm>
+          <a:prstGeom prst="ellipse">
+            <a:avLst/>
+          </a:prstGeom>
+        </p:spPr>
+        <p:style>
+          <a:lnRef idx="1">
+            <a:schemeClr val="accent1"/>
+          </a:lnRef>
+          <a:fillRef idx="3">
+            <a:schemeClr val="accent1"/>
+          </a:fillRef>
+          <a:effectRef idx="2">
+            <a:schemeClr val="accent1"/>
+          </a:effectRef>
+          <a:fontRef idx="minor">
+            <a:schemeClr val="lt1"/>
+          </a:fontRef>
+        </p:style>
+        <p:txBody>
+          <a:bodyPr rtlCol="0" anchor="ctr"/>
+          <a:lstStyle/>
+          <a:p>
+            <a:pPr algn="ctr"/>
+            <a:endParaRPr lang="en-US"/>
+          </a:p>
+        </p:txBody>
+      </p:sp>
+      <p:sp>
+        <p:nvSpPr>
+          <p:cNvPr id="120" name="Oval 119"/>
+          <p:cNvSpPr>
+            <a:spLocks noChangeAspect="1"/>
+          </p:cNvSpPr>
+          <p:nvPr/>
+        </p:nvSpPr>
+        <p:spPr>
+          <a:xfrm>
+            <a:off x="7227221" y="1635747"/>
+            <a:ext cx="274320" cy="274320"/>
+          </a:xfrm>
+          <a:prstGeom prst="ellipse">
+            <a:avLst/>
+          </a:prstGeom>
+        </p:spPr>
+        <p:style>
+          <a:lnRef idx="1">
+            <a:schemeClr val="accent1"/>
+          </a:lnRef>
+          <a:fillRef idx="3">
+            <a:schemeClr val="accent1"/>
+          </a:fillRef>
+          <a:effectRef idx="2">
+            <a:schemeClr val="accent1"/>
+          </a:effectRef>
+          <a:fontRef idx="minor">
+            <a:schemeClr val="lt1"/>
+          </a:fontRef>
+        </p:style>
+        <p:txBody>
+          <a:bodyPr rtlCol="0" anchor="ctr"/>
+          <a:lstStyle/>
+          <a:p>
+            <a:pPr algn="ctr"/>
+            <a:endParaRPr lang="en-US"/>
+          </a:p>
+        </p:txBody>
+      </p:sp>
+      <p:sp>
+        <p:nvSpPr>
+          <p:cNvPr id="121" name="Oval 120"/>
+          <p:cNvSpPr>
+            <a:spLocks noChangeAspect="1"/>
+          </p:cNvSpPr>
+          <p:nvPr/>
+        </p:nvSpPr>
+        <p:spPr>
+          <a:xfrm>
+            <a:off x="6451081" y="1635747"/>
+            <a:ext cx="274320" cy="274320"/>
+          </a:xfrm>
+          <a:prstGeom prst="ellipse">
+            <a:avLst/>
+          </a:prstGeom>
+        </p:spPr>
+        <p:style>
+          <a:lnRef idx="1">
+            <a:schemeClr val="accent1"/>
+          </a:lnRef>
+          <a:fillRef idx="3">
+            <a:schemeClr val="accent1"/>
+          </a:fillRef>
+          <a:effectRef idx="2">
+            <a:schemeClr val="accent1"/>
+          </a:effectRef>
+          <a:fontRef idx="minor">
+            <a:schemeClr val="lt1"/>
+          </a:fontRef>
+        </p:style>
+        <p:txBody>
+          <a:bodyPr rtlCol="0" anchor="ctr"/>
+          <a:lstStyle/>
+          <a:p>
+            <a:pPr algn="ctr"/>
+            <a:endParaRPr lang="en-US"/>
+          </a:p>
+        </p:txBody>
+      </p:sp>
+      <p:sp>
+        <p:nvSpPr>
+          <p:cNvPr id="122" name="Oval 121"/>
+          <p:cNvSpPr>
+            <a:spLocks noChangeAspect="1"/>
+          </p:cNvSpPr>
+          <p:nvPr/>
+        </p:nvSpPr>
+        <p:spPr>
+          <a:xfrm>
+            <a:off x="3176117" y="2742079"/>
+            <a:ext cx="274320" cy="274320"/>
+          </a:xfrm>
+          <a:prstGeom prst="ellipse">
+            <a:avLst/>
+          </a:prstGeom>
+        </p:spPr>
+        <p:style>
+          <a:lnRef idx="1">
+            <a:schemeClr val="accent1"/>
+          </a:lnRef>
+          <a:fillRef idx="3">
+            <a:schemeClr val="accent1"/>
+          </a:fillRef>
+          <a:effectRef idx="2">
+            <a:schemeClr val="accent1"/>
+          </a:effectRef>
+          <a:fontRef idx="minor">
+            <a:schemeClr val="lt1"/>
+          </a:fontRef>
+        </p:style>
+        <p:txBody>
+          <a:bodyPr rtlCol="0" anchor="ctr"/>
+          <a:lstStyle/>
+          <a:p>
+            <a:pPr algn="ctr"/>
+            <a:endParaRPr lang="en-US"/>
+          </a:p>
+        </p:txBody>
+      </p:sp>
+      <p:sp>
+        <p:nvSpPr>
+          <p:cNvPr id="123" name="TextBox 122"/>
+          <p:cNvSpPr txBox="1"/>
+          <p:nvPr/>
+        </p:nvSpPr>
+        <p:spPr>
+          <a:xfrm>
+            <a:off x="494484" y="1178374"/>
+            <a:ext cx="418654" cy="646331"/>
+          </a:xfrm>
+          <a:prstGeom prst="rect">
+            <a:avLst/>
+          </a:prstGeom>
+          <a:noFill/>
+        </p:spPr>
+        <p:txBody>
+          <a:bodyPr wrap="none" rtlCol="0">
+            <a:spAutoFit/>
+          </a:bodyPr>
+          <a:lstStyle/>
+          <a:p>
+            <a:r>
+              <a:rPr lang="en-US" sz="3600" b="1" dirty="0" smtClean="0"/>
+              <a:t>0</a:t>
+            </a:r>
+            <a:endParaRPr lang="en-US" sz="3600" b="1" dirty="0"/>
+          </a:p>
+        </p:txBody>
+      </p:sp>
+      <p:sp>
+        <p:nvSpPr>
+          <p:cNvPr id="124" name="TextBox 123"/>
+          <p:cNvSpPr txBox="1"/>
+          <p:nvPr/>
+        </p:nvSpPr>
+        <p:spPr>
+          <a:xfrm>
+            <a:off x="1245939" y="1178374"/>
+            <a:ext cx="418654" cy="646331"/>
+          </a:xfrm>
+          <a:prstGeom prst="rect">
+            <a:avLst/>
+          </a:prstGeom>
+          <a:noFill/>
+        </p:spPr>
+        <p:txBody>
+          <a:bodyPr wrap="none" rtlCol="0">
+            <a:spAutoFit/>
+          </a:bodyPr>
+          <a:lstStyle/>
+          <a:p>
+            <a:r>
+              <a:rPr lang="en-US" sz="3600" b="1" dirty="0"/>
+              <a:t>5</a:t>
+            </a:r>
+          </a:p>
+        </p:txBody>
+      </p:sp>
+      <p:sp>
+        <p:nvSpPr>
+          <p:cNvPr id="125" name="TextBox 124"/>
+          <p:cNvSpPr txBox="1"/>
+          <p:nvPr/>
+        </p:nvSpPr>
+        <p:spPr>
+          <a:xfrm>
+            <a:off x="1988111" y="1223563"/>
+            <a:ext cx="652643" cy="646331"/>
+          </a:xfrm>
+          <a:prstGeom prst="rect">
+            <a:avLst/>
+          </a:prstGeom>
+          <a:noFill/>
+        </p:spPr>
+        <p:txBody>
+          <a:bodyPr wrap="none" rtlCol="0">
+            <a:spAutoFit/>
+          </a:bodyPr>
+          <a:lstStyle/>
+          <a:p>
+            <a:r>
+              <a:rPr lang="en-US" sz="3600" b="1" dirty="0" smtClean="0"/>
+              <a:t>10</a:t>
+            </a:r>
+            <a:endParaRPr lang="en-US" sz="3600" b="1" dirty="0"/>
+          </a:p>
+        </p:txBody>
+      </p:sp>
+      <p:sp>
+        <p:nvSpPr>
+          <p:cNvPr id="126" name="TextBox 125"/>
+          <p:cNvSpPr txBox="1"/>
+          <p:nvPr/>
+        </p:nvSpPr>
+        <p:spPr>
+          <a:xfrm>
+            <a:off x="3081312" y="2977610"/>
+            <a:ext cx="652643" cy="646331"/>
+          </a:xfrm>
+          <a:prstGeom prst="rect">
+            <a:avLst/>
+          </a:prstGeom>
+          <a:noFill/>
+        </p:spPr>
+        <p:txBody>
+          <a:bodyPr wrap="none" rtlCol="0">
+            <a:spAutoFit/>
+          </a:bodyPr>
+          <a:lstStyle/>
+          <a:p>
+            <a:r>
+              <a:rPr lang="en-US" sz="3600" b="1" dirty="0" smtClean="0"/>
+              <a:t>30</a:t>
+            </a:r>
+            <a:endParaRPr lang="en-US" sz="3600" b="1" dirty="0"/>
+          </a:p>
+        </p:txBody>
+      </p:sp>
+      <p:sp>
+        <p:nvSpPr>
+          <p:cNvPr id="127" name="TextBox 126"/>
+          <p:cNvSpPr txBox="1"/>
+          <p:nvPr/>
+        </p:nvSpPr>
+        <p:spPr>
+          <a:xfrm>
+            <a:off x="7108284" y="1041916"/>
+            <a:ext cx="652643" cy="646331"/>
+          </a:xfrm>
+          <a:prstGeom prst="rect">
+            <a:avLst/>
+          </a:prstGeom>
+          <a:noFill/>
+        </p:spPr>
+        <p:txBody>
+          <a:bodyPr wrap="none" rtlCol="0">
+            <a:spAutoFit/>
+          </a:bodyPr>
+          <a:lstStyle/>
+          <a:p>
+            <a:r>
+              <a:rPr lang="en-US" sz="3600" b="1" dirty="0" smtClean="0"/>
+              <a:t>57</a:t>
+            </a:r>
+            <a:endParaRPr lang="en-US" sz="3600" b="1" dirty="0"/>
+          </a:p>
+        </p:txBody>
+      </p:sp>
+      <p:sp>
+        <p:nvSpPr>
+          <p:cNvPr id="128" name="TextBox 127"/>
+          <p:cNvSpPr txBox="1"/>
+          <p:nvPr/>
+        </p:nvSpPr>
+        <p:spPr>
+          <a:xfrm>
+            <a:off x="1063002" y="2881149"/>
+            <a:ext cx="418654" cy="646331"/>
+          </a:xfrm>
+          <a:prstGeom prst="rect">
+            <a:avLst/>
+          </a:prstGeom>
+          <a:noFill/>
+        </p:spPr>
+        <p:txBody>
+          <a:bodyPr wrap="none" rtlCol="0">
+            <a:spAutoFit/>
+          </a:bodyPr>
+          <a:lstStyle/>
+          <a:p>
+            <a:r>
+              <a:rPr lang="en-US" sz="3600" b="1" dirty="0" smtClean="0"/>
+              <a:t>0</a:t>
+            </a:r>
+            <a:endParaRPr lang="en-US" sz="3600" b="1" dirty="0"/>
+          </a:p>
+        </p:txBody>
+      </p:sp>
+      <p:sp>
+        <p:nvSpPr>
+          <p:cNvPr id="129" name="TextBox 128"/>
+          <p:cNvSpPr txBox="1"/>
+          <p:nvPr/>
+        </p:nvSpPr>
+        <p:spPr>
+          <a:xfrm>
+            <a:off x="2757463" y="1904718"/>
+            <a:ext cx="652643" cy="646331"/>
+          </a:xfrm>
+          <a:prstGeom prst="rect">
+            <a:avLst/>
+          </a:prstGeom>
+          <a:noFill/>
+        </p:spPr>
+        <p:txBody>
+          <a:bodyPr wrap="none" rtlCol="0">
+            <a:spAutoFit/>
+          </a:bodyPr>
+          <a:lstStyle/>
+          <a:p>
+            <a:r>
+              <a:rPr lang="en-US" sz="3600" b="1" dirty="0" smtClean="0"/>
+              <a:t>20</a:t>
+            </a:r>
+            <a:endParaRPr lang="en-US" sz="3600" b="1" dirty="0"/>
+          </a:p>
+        </p:txBody>
+      </p:sp>
+      <p:sp>
+        <p:nvSpPr>
+          <p:cNvPr id="130" name="TextBox 129"/>
+          <p:cNvSpPr txBox="1"/>
+          <p:nvPr/>
+        </p:nvSpPr>
+        <p:spPr>
+          <a:xfrm>
+            <a:off x="3865224" y="2944043"/>
+            <a:ext cx="652643" cy="646331"/>
+          </a:xfrm>
+          <a:prstGeom prst="rect">
+            <a:avLst/>
+          </a:prstGeom>
+          <a:noFill/>
+        </p:spPr>
+        <p:txBody>
+          <a:bodyPr wrap="none" rtlCol="0">
+            <a:spAutoFit/>
+          </a:bodyPr>
+          <a:lstStyle/>
+          <a:p>
+            <a:r>
+              <a:rPr lang="en-US" sz="3600" b="1" dirty="0" smtClean="0"/>
+              <a:t>34</a:t>
+            </a:r>
+            <a:endParaRPr lang="en-US" sz="3600" b="1" dirty="0"/>
+          </a:p>
+        </p:txBody>
+      </p:sp>
+      <p:sp>
+        <p:nvSpPr>
+          <p:cNvPr id="131" name="TextBox 130"/>
+          <p:cNvSpPr txBox="1"/>
+          <p:nvPr/>
+        </p:nvSpPr>
+        <p:spPr>
+          <a:xfrm>
+            <a:off x="4593605" y="2944043"/>
+            <a:ext cx="652643" cy="646331"/>
+          </a:xfrm>
+          <a:prstGeom prst="rect">
+            <a:avLst/>
+          </a:prstGeom>
+          <a:noFill/>
+        </p:spPr>
+        <p:txBody>
+          <a:bodyPr wrap="none" rtlCol="0">
+            <a:spAutoFit/>
+          </a:bodyPr>
+          <a:lstStyle/>
+          <a:p>
+            <a:r>
+              <a:rPr lang="en-US" sz="3600" b="1" dirty="0" smtClean="0"/>
+              <a:t>50</a:t>
+            </a:r>
+            <a:endParaRPr lang="en-US" sz="3600" b="1" dirty="0"/>
+          </a:p>
+        </p:txBody>
+      </p:sp>
+      <p:sp>
+        <p:nvSpPr>
+          <p:cNvPr id="132" name="TextBox 131"/>
+          <p:cNvSpPr txBox="1"/>
+          <p:nvPr/>
+        </p:nvSpPr>
+        <p:spPr>
+          <a:xfrm>
+            <a:off x="5104591" y="1959615"/>
+            <a:ext cx="652643" cy="646331"/>
+          </a:xfrm>
+          <a:prstGeom prst="rect">
+            <a:avLst/>
+          </a:prstGeom>
+          <a:noFill/>
+        </p:spPr>
+        <p:txBody>
+          <a:bodyPr wrap="none" rtlCol="0">
+            <a:spAutoFit/>
+          </a:bodyPr>
+          <a:lstStyle/>
+          <a:p>
+            <a:r>
+              <a:rPr lang="en-US" sz="3600" b="1" dirty="0" smtClean="0"/>
+              <a:t>50</a:t>
+            </a:r>
+            <a:endParaRPr lang="en-US" sz="3600" b="1" dirty="0"/>
+          </a:p>
+        </p:txBody>
+      </p:sp>
+      <p:sp>
+        <p:nvSpPr>
+          <p:cNvPr id="133" name="TextBox 132"/>
+          <p:cNvSpPr txBox="1"/>
+          <p:nvPr/>
+        </p:nvSpPr>
+        <p:spPr>
+          <a:xfrm>
+            <a:off x="5329853" y="2944043"/>
+            <a:ext cx="652643" cy="646331"/>
+          </a:xfrm>
+          <a:prstGeom prst="rect">
+            <a:avLst/>
+          </a:prstGeom>
+          <a:noFill/>
+        </p:spPr>
+        <p:txBody>
+          <a:bodyPr wrap="none" rtlCol="0">
+            <a:spAutoFit/>
+          </a:bodyPr>
+          <a:lstStyle/>
+          <a:p>
+            <a:r>
+              <a:rPr lang="en-US" sz="3600" b="1" dirty="0" smtClean="0"/>
+              <a:t>51</a:t>
+            </a:r>
+            <a:endParaRPr lang="en-US" sz="3600" b="1" dirty="0"/>
+          </a:p>
+        </p:txBody>
+      </p:sp>
+      <p:sp>
+        <p:nvSpPr>
+          <p:cNvPr id="134" name="TextBox 133"/>
+          <p:cNvSpPr txBox="1"/>
+          <p:nvPr/>
+        </p:nvSpPr>
+        <p:spPr>
+          <a:xfrm>
+            <a:off x="6241754" y="2977610"/>
+            <a:ext cx="652643" cy="646331"/>
+          </a:xfrm>
+          <a:prstGeom prst="rect">
+            <a:avLst/>
+          </a:prstGeom>
+          <a:noFill/>
+        </p:spPr>
+        <p:txBody>
+          <a:bodyPr wrap="none" rtlCol="0">
+            <a:spAutoFit/>
+          </a:bodyPr>
+          <a:lstStyle/>
+          <a:p>
+            <a:r>
+              <a:rPr lang="en-US" sz="3600" b="1" dirty="0" smtClean="0"/>
+              <a:t>52</a:t>
+            </a:r>
+            <a:endParaRPr lang="en-US" sz="3600" b="1" dirty="0"/>
+          </a:p>
+        </p:txBody>
+      </p:sp>
+      <p:sp>
+        <p:nvSpPr>
+          <p:cNvPr id="135" name="TextBox 134"/>
+          <p:cNvSpPr txBox="1"/>
+          <p:nvPr/>
+        </p:nvSpPr>
+        <p:spPr>
+          <a:xfrm>
+            <a:off x="6306747" y="1061579"/>
+            <a:ext cx="652643" cy="646331"/>
+          </a:xfrm>
+          <a:prstGeom prst="rect">
+            <a:avLst/>
+          </a:prstGeom>
+          <a:noFill/>
+        </p:spPr>
+        <p:txBody>
+          <a:bodyPr wrap="none" rtlCol="0">
+            <a:spAutoFit/>
+          </a:bodyPr>
+          <a:lstStyle/>
+          <a:p>
+            <a:r>
+              <a:rPr lang="en-US" sz="3600" b="1" dirty="0" smtClean="0"/>
+              <a:t>55</a:t>
+            </a:r>
+            <a:endParaRPr lang="en-US" sz="3600" b="1" dirty="0"/>
+          </a:p>
+        </p:txBody>
+      </p:sp>
+      <p:sp>
+        <p:nvSpPr>
+          <p:cNvPr id="136" name="Oval 135"/>
+          <p:cNvSpPr>
+            <a:spLocks noChangeAspect="1"/>
+          </p:cNvSpPr>
+          <p:nvPr/>
+        </p:nvSpPr>
+        <p:spPr>
+          <a:xfrm>
+            <a:off x="7227221" y="2772395"/>
+            <a:ext cx="274320" cy="274320"/>
+          </a:xfrm>
+          <a:prstGeom prst="ellipse">
+            <a:avLst/>
+          </a:prstGeom>
+        </p:spPr>
+        <p:style>
+          <a:lnRef idx="1">
+            <a:schemeClr val="accent1"/>
+          </a:lnRef>
+          <a:fillRef idx="3">
+            <a:schemeClr val="accent1"/>
+          </a:fillRef>
+          <a:effectRef idx="2">
+            <a:schemeClr val="accent1"/>
+          </a:effectRef>
+          <a:fontRef idx="minor">
+            <a:schemeClr val="lt1"/>
+          </a:fontRef>
+        </p:style>
+        <p:txBody>
+          <a:bodyPr rtlCol="0" anchor="ctr"/>
+          <a:lstStyle/>
+          <a:p>
+            <a:pPr algn="ctr"/>
+            <a:endParaRPr lang="en-US"/>
+          </a:p>
+        </p:txBody>
+      </p:sp>
+      <p:sp>
+        <p:nvSpPr>
+          <p:cNvPr id="137" name="TextBox 136"/>
+          <p:cNvSpPr txBox="1"/>
+          <p:nvPr/>
+        </p:nvSpPr>
+        <p:spPr>
+          <a:xfrm>
+            <a:off x="7260932" y="2017819"/>
+            <a:ext cx="652643" cy="646331"/>
+          </a:xfrm>
+          <a:prstGeom prst="rect">
+            <a:avLst/>
+          </a:prstGeom>
+          <a:noFill/>
+        </p:spPr>
+        <p:txBody>
+          <a:bodyPr wrap="none" rtlCol="0">
+            <a:spAutoFit/>
+          </a:bodyPr>
+          <a:lstStyle/>
+          <a:p>
+            <a:r>
+              <a:rPr lang="en-US" sz="3600" b="1" dirty="0" smtClean="0"/>
+              <a:t>57</a:t>
+            </a:r>
+            <a:endParaRPr lang="en-US" sz="3600" b="1" dirty="0"/>
+          </a:p>
+        </p:txBody>
+      </p:sp>
+      <p:sp>
+        <p:nvSpPr>
+          <p:cNvPr id="138" name="TextBox 137"/>
+          <p:cNvSpPr txBox="1"/>
+          <p:nvPr/>
+        </p:nvSpPr>
+        <p:spPr>
+          <a:xfrm>
+            <a:off x="7224418" y="2977610"/>
+            <a:ext cx="652643" cy="646331"/>
+          </a:xfrm>
+          <a:prstGeom prst="rect">
+            <a:avLst/>
+          </a:prstGeom>
+          <a:noFill/>
+        </p:spPr>
+        <p:txBody>
+          <a:bodyPr wrap="none" rtlCol="0">
+            <a:spAutoFit/>
+          </a:bodyPr>
+          <a:lstStyle/>
+          <a:p>
+            <a:r>
+              <a:rPr lang="en-US" sz="3600" b="1" dirty="0" smtClean="0"/>
+              <a:t>80</a:t>
+            </a:r>
+            <a:endParaRPr lang="en-US" sz="3600" b="1" dirty="0"/>
+          </a:p>
+        </p:txBody>
+      </p:sp>
+      <p:sp>
+        <p:nvSpPr>
+          <p:cNvPr id="139" name="TextBox 138"/>
+          <p:cNvSpPr txBox="1"/>
+          <p:nvPr/>
+        </p:nvSpPr>
+        <p:spPr>
+          <a:xfrm>
+            <a:off x="8271006" y="2944043"/>
+            <a:ext cx="652643" cy="646331"/>
+          </a:xfrm>
+          <a:prstGeom prst="rect">
+            <a:avLst/>
+          </a:prstGeom>
+          <a:noFill/>
+        </p:spPr>
+        <p:txBody>
+          <a:bodyPr wrap="none" rtlCol="0">
+            <a:spAutoFit/>
+          </a:bodyPr>
+          <a:lstStyle/>
+          <a:p>
+            <a:r>
+              <a:rPr lang="en-US" sz="3600" b="1" dirty="0" smtClean="0"/>
+              <a:t>81</a:t>
+            </a:r>
+            <a:endParaRPr lang="en-US" sz="3600" b="1" dirty="0"/>
+          </a:p>
+        </p:txBody>
+      </p:sp>
+      <p:sp>
+        <p:nvSpPr>
+          <p:cNvPr id="140" name="TextBox 139"/>
+          <p:cNvSpPr txBox="1"/>
+          <p:nvPr/>
+        </p:nvSpPr>
+        <p:spPr>
+          <a:xfrm>
+            <a:off x="8583962" y="1716964"/>
+            <a:ext cx="464415" cy="646331"/>
+          </a:xfrm>
+          <a:prstGeom prst="rect">
+            <a:avLst/>
+          </a:prstGeom>
+          <a:noFill/>
+        </p:spPr>
+        <p:txBody>
+          <a:bodyPr wrap="none" rtlCol="0">
+            <a:spAutoFit/>
+          </a:bodyPr>
+          <a:lstStyle/>
+          <a:p>
+            <a:r>
+              <a:rPr lang="en-US" sz="3600" b="1" dirty="0" smtClean="0"/>
+              <a:t>A</a:t>
+            </a:r>
+            <a:endParaRPr lang="en-US" sz="3600" b="1" dirty="0"/>
+          </a:p>
+        </p:txBody>
+      </p:sp>
+      <p:sp>
+        <p:nvSpPr>
+          <p:cNvPr id="141" name="TextBox 140"/>
+          <p:cNvSpPr txBox="1"/>
+          <p:nvPr/>
+        </p:nvSpPr>
+        <p:spPr>
+          <a:xfrm>
+            <a:off x="8649130" y="2191524"/>
+            <a:ext cx="443451" cy="646331"/>
+          </a:xfrm>
+          <a:prstGeom prst="rect">
+            <a:avLst/>
+          </a:prstGeom>
+          <a:noFill/>
+        </p:spPr>
+        <p:txBody>
+          <a:bodyPr wrap="none" rtlCol="0">
+            <a:spAutoFit/>
+          </a:bodyPr>
+          <a:lstStyle/>
+          <a:p>
+            <a:r>
+              <a:rPr lang="en-US" sz="3600" b="1" dirty="0"/>
+              <a:t>B</a:t>
+            </a:r>
+          </a:p>
+        </p:txBody>
+      </p:sp>
+      <p:cxnSp>
+        <p:nvCxnSpPr>
+          <p:cNvPr id="32" name="Straight Arrow Connector 31"/>
+          <p:cNvCxnSpPr/>
+          <p:nvPr/>
+        </p:nvCxnSpPr>
+        <p:spPr>
+          <a:xfrm>
+            <a:off x="1988111" y="2017819"/>
+            <a:ext cx="769352" cy="685471"/>
+          </a:xfrm>
+          <a:prstGeom prst="straightConnector1">
+            <a:avLst/>
+          </a:prstGeom>
+          <a:ln w="76200" cmpd="sng">
+            <a:solidFill>
+              <a:srgbClr val="800000"/>
+            </a:solidFill>
+            <a:tailEnd type="arrow"/>
+          </a:ln>
+        </p:spPr>
+        <p:style>
+          <a:lnRef idx="2">
+            <a:schemeClr val="accent1"/>
+          </a:lnRef>
+          <a:fillRef idx="0">
+            <a:schemeClr val="accent1"/>
+          </a:fillRef>
+          <a:effectRef idx="1">
+            <a:schemeClr val="accent1"/>
+          </a:effectRef>
+          <a:fontRef idx="minor">
+            <a:schemeClr val="tx1"/>
+          </a:fontRef>
+        </p:style>
+      </p:cxnSp>
+      <p:sp>
+        <p:nvSpPr>
+          <p:cNvPr id="143" name="TextBox 142"/>
+          <p:cNvSpPr txBox="1"/>
+          <p:nvPr/>
+        </p:nvSpPr>
+        <p:spPr>
+          <a:xfrm>
+            <a:off x="328310" y="3619017"/>
+            <a:ext cx="3688956" cy="523220"/>
+          </a:xfrm>
+          <a:prstGeom prst="rect">
+            <a:avLst/>
+          </a:prstGeom>
+          <a:solidFill>
+            <a:srgbClr val="FFFF00"/>
+          </a:solidFill>
+        </p:spPr>
+        <p:txBody>
+          <a:bodyPr wrap="none" rtlCol="0">
+            <a:spAutoFit/>
+          </a:bodyPr>
+          <a:lstStyle/>
+          <a:p>
+            <a:r>
+              <a:rPr lang="en-US" sz="2800" b="1" dirty="0" smtClean="0"/>
+              <a:t>Timestamp on message</a:t>
+            </a:r>
+            <a:endParaRPr lang="en-US" sz="2800" b="1" dirty="0"/>
+          </a:p>
+        </p:txBody>
+      </p:sp>
+      <p:cxnSp>
+        <p:nvCxnSpPr>
+          <p:cNvPr id="36" name="Straight Arrow Connector 35"/>
+          <p:cNvCxnSpPr>
+            <a:stCxn id="143" idx="0"/>
+          </p:cNvCxnSpPr>
+          <p:nvPr/>
+        </p:nvCxnSpPr>
+        <p:spPr>
+          <a:xfrm flipV="1">
+            <a:off x="2172788" y="2363295"/>
+            <a:ext cx="141656" cy="1255722"/>
+          </a:xfrm>
+          <a:prstGeom prst="straightConnector1">
+            <a:avLst/>
+          </a:prstGeom>
+          <a:ln>
+            <a:prstDash val="dash"/>
+            <a:tailEnd type="arrow"/>
+          </a:ln>
+        </p:spPr>
+        <p:style>
+          <a:lnRef idx="2">
+            <a:schemeClr val="accent1"/>
+          </a:lnRef>
+          <a:fillRef idx="0">
+            <a:schemeClr val="accent1"/>
+          </a:fillRef>
+          <a:effectRef idx="1">
+            <a:schemeClr val="accent1"/>
+          </a:effectRef>
+          <a:fontRef idx="minor">
+            <a:schemeClr val="tx1"/>
+          </a:fontRef>
+        </p:style>
+      </p:cxnSp>
+      <p:sp>
+        <p:nvSpPr>
+          <p:cNvPr id="144" name="TextBox 143"/>
+          <p:cNvSpPr txBox="1"/>
+          <p:nvPr/>
+        </p:nvSpPr>
+        <p:spPr>
+          <a:xfrm>
+            <a:off x="4593342" y="4045614"/>
+            <a:ext cx="4330307" cy="523220"/>
+          </a:xfrm>
+          <a:prstGeom prst="rect">
+            <a:avLst/>
+          </a:prstGeom>
+          <a:solidFill>
+            <a:srgbClr val="FFFF00"/>
+          </a:solidFill>
+        </p:spPr>
+        <p:txBody>
+          <a:bodyPr wrap="none" rtlCol="0">
+            <a:spAutoFit/>
+          </a:bodyPr>
+          <a:lstStyle/>
+          <a:p>
+            <a:r>
+              <a:rPr lang="en-US" sz="2800" b="1" dirty="0" smtClean="0"/>
+              <a:t>Timestamp of receive event</a:t>
+            </a:r>
+            <a:endParaRPr lang="en-US" sz="2800" b="1" dirty="0"/>
+          </a:p>
+        </p:txBody>
+      </p:sp>
+      <p:cxnSp>
+        <p:nvCxnSpPr>
+          <p:cNvPr id="53" name="Straight Arrow Connector 52"/>
+          <p:cNvCxnSpPr>
+            <a:stCxn id="144" idx="0"/>
+            <a:endCxn id="126" idx="0"/>
+          </p:cNvCxnSpPr>
+          <p:nvPr/>
+        </p:nvCxnSpPr>
+        <p:spPr>
+          <a:xfrm flipH="1" flipV="1">
+            <a:off x="3407634" y="2977610"/>
+            <a:ext cx="3350862" cy="1068004"/>
+          </a:xfrm>
+          <a:prstGeom prst="straightConnector1">
+            <a:avLst/>
+          </a:prstGeom>
+          <a:ln>
+            <a:prstDash val="dash"/>
+            <a:tailEnd type="arrow"/>
+          </a:ln>
+        </p:spPr>
+        <p:style>
+          <a:lnRef idx="2">
+            <a:schemeClr val="accent1"/>
+          </a:lnRef>
+          <a:fillRef idx="0">
+            <a:schemeClr val="accent1"/>
+          </a:fillRef>
+          <a:effectRef idx="1">
+            <a:schemeClr val="accent1"/>
+          </a:effectRef>
+          <a:fontRef idx="minor">
+            <a:schemeClr val="tx1"/>
+          </a:fontRef>
+        </p:style>
+      </p:cxnSp>
+    </p:spTree>
+    <p:extLst>
+      <p:ext uri="{BB962C8B-B14F-4D97-AF65-F5344CB8AC3E}">
+        <p14:creationId xmlns:p14="http://schemas.microsoft.com/office/powerpoint/2010/main" val="341328037"/>
+      </p:ext>
+    </p:extLst>
+  </p:cSld>
+  <p:clrMapOvr>
+    <a:masterClrMapping/>
+  </p:clrMapOvr>
+  <p:timing>
+    <p:tnLst>
+      <p:par>
+        <p:cTn xmlns:p14="http://schemas.microsoft.com/office/powerpoint/2010/main" id="1" dur="indefinite" restart="never" nodeType="tmRoot"/>
+      </p:par>
+    </p:tnLst>
+  </p:timing>
+</p:sld>
+</file>
+
 <file path=ppt/slides/slide2.xml><?xml version="1.0" encoding="utf-8"?>
 <p:sld xmlns:a="http://schemas.openxmlformats.org/drawingml/2006/main" xmlns:r="http://schemas.openxmlformats.org/officeDocument/2006/relationships" xmlns:p="http://schemas.openxmlformats.org/presentationml/2006/main">
   <p:cSld>
@@ -13156,6 +16026,13 @@
   <p:clrMapOvr>
     <a:masterClrMapping/>
   </p:clrMapOvr>
+  <p:timing>
+    <p:tnLst>
+      <p:par>
+        <p:cTn xmlns:p14="http://schemas.microsoft.com/office/powerpoint/2010/main" id="1" dur="indefinite" restart="never" nodeType="tmRoot"/>
+      </p:par>
+    </p:tnLst>
+  </p:timing>
 </p:sld>
 </file>
 
@@ -15824,6 +18701,13 @@
   <p:clrMapOvr>
     <a:masterClrMapping/>
   </p:clrMapOvr>
+  <p:timing>
+    <p:tnLst>
+      <p:par>
+        <p:cTn xmlns:p14="http://schemas.microsoft.com/office/powerpoint/2010/main" id="1" dur="indefinite" restart="never" nodeType="tmRoot"/>
+      </p:par>
+    </p:tnLst>
+  </p:timing>
 </p:sld>
 </file>
 
@@ -17522,6 +20406,13 @@
   <p:clrMapOvr>
     <a:masterClrMapping/>
   </p:clrMapOvr>
+  <p:timing>
+    <p:tnLst>
+      <p:par>
+        <p:cTn xmlns:p14="http://schemas.microsoft.com/office/powerpoint/2010/main" id="1" dur="indefinite" restart="never" nodeType="tmRoot"/>
+      </p:par>
+    </p:tnLst>
+  </p:timing>
 </p:sld>
 </file>
 

</xml_diff>

<commit_message>
Changed "and" deadlock detection.
</commit_message>
<xml_diff>
--- a/ChannelSnapshots/ChannelSnapshots_Figures.pptx
+++ b/ChannelSnapshots/ChannelSnapshots_Figures.pptx
@@ -20,6 +20,7 @@
     <p:sldId id="270" r:id="rId14"/>
     <p:sldId id="271" r:id="rId15"/>
     <p:sldId id="272" r:id="rId16"/>
+    <p:sldId id="273" r:id="rId17"/>
   </p:sldIdLst>
   <p:sldSz cx="9144000" cy="6858000" type="screen4x3"/>
   <p:notesSz cx="6858000" cy="9144000"/>
@@ -302,7 +303,7 @@
           <a:p>
             <a:fld id="{46569D23-BA87-4E43-A6F0-6EC25AA0BD21}" type="datetimeFigureOut">
               <a:rPr lang="en-US" smtClean="0"/>
-              <a:t>9/21/21</a:t>
+              <a:t>9/23/21</a:t>
             </a:fld>
             <a:endParaRPr lang="en-US"/>
           </a:p>
@@ -472,7 +473,7 @@
           <a:p>
             <a:fld id="{46569D23-BA87-4E43-A6F0-6EC25AA0BD21}" type="datetimeFigureOut">
               <a:rPr lang="en-US" smtClean="0"/>
-              <a:t>9/21/21</a:t>
+              <a:t>9/23/21</a:t>
             </a:fld>
             <a:endParaRPr lang="en-US"/>
           </a:p>
@@ -652,7 +653,7 @@
           <a:p>
             <a:fld id="{46569D23-BA87-4E43-A6F0-6EC25AA0BD21}" type="datetimeFigureOut">
               <a:rPr lang="en-US" smtClean="0"/>
-              <a:t>9/21/21</a:t>
+              <a:t>9/23/21</a:t>
             </a:fld>
             <a:endParaRPr lang="en-US"/>
           </a:p>
@@ -822,7 +823,7 @@
           <a:p>
             <a:fld id="{46569D23-BA87-4E43-A6F0-6EC25AA0BD21}" type="datetimeFigureOut">
               <a:rPr lang="en-US" smtClean="0"/>
-              <a:t>9/21/21</a:t>
+              <a:t>9/23/21</a:t>
             </a:fld>
             <a:endParaRPr lang="en-US"/>
           </a:p>
@@ -1068,7 +1069,7 @@
           <a:p>
             <a:fld id="{46569D23-BA87-4E43-A6F0-6EC25AA0BD21}" type="datetimeFigureOut">
               <a:rPr lang="en-US" smtClean="0"/>
-              <a:t>9/21/21</a:t>
+              <a:t>9/23/21</a:t>
             </a:fld>
             <a:endParaRPr lang="en-US"/>
           </a:p>
@@ -1356,7 +1357,7 @@
           <a:p>
             <a:fld id="{46569D23-BA87-4E43-A6F0-6EC25AA0BD21}" type="datetimeFigureOut">
               <a:rPr lang="en-US" smtClean="0"/>
-              <a:t>9/21/21</a:t>
+              <a:t>9/23/21</a:t>
             </a:fld>
             <a:endParaRPr lang="en-US"/>
           </a:p>
@@ -1778,7 +1779,7 @@
           <a:p>
             <a:fld id="{46569D23-BA87-4E43-A6F0-6EC25AA0BD21}" type="datetimeFigureOut">
               <a:rPr lang="en-US" smtClean="0"/>
-              <a:t>9/21/21</a:t>
+              <a:t>9/23/21</a:t>
             </a:fld>
             <a:endParaRPr lang="en-US"/>
           </a:p>
@@ -1896,7 +1897,7 @@
           <a:p>
             <a:fld id="{46569D23-BA87-4E43-A6F0-6EC25AA0BD21}" type="datetimeFigureOut">
               <a:rPr lang="en-US" smtClean="0"/>
-              <a:t>9/21/21</a:t>
+              <a:t>9/23/21</a:t>
             </a:fld>
             <a:endParaRPr lang="en-US"/>
           </a:p>
@@ -1991,7 +1992,7 @@
           <a:p>
             <a:fld id="{46569D23-BA87-4E43-A6F0-6EC25AA0BD21}" type="datetimeFigureOut">
               <a:rPr lang="en-US" smtClean="0"/>
-              <a:t>9/21/21</a:t>
+              <a:t>9/23/21</a:t>
             </a:fld>
             <a:endParaRPr lang="en-US"/>
           </a:p>
@@ -2268,7 +2269,7 @@
           <a:p>
             <a:fld id="{46569D23-BA87-4E43-A6F0-6EC25AA0BD21}" type="datetimeFigureOut">
               <a:rPr lang="en-US" smtClean="0"/>
-              <a:t>9/21/21</a:t>
+              <a:t>9/23/21</a:t>
             </a:fld>
             <a:endParaRPr lang="en-US"/>
           </a:p>
@@ -2521,7 +2522,7 @@
           <a:p>
             <a:fld id="{46569D23-BA87-4E43-A6F0-6EC25AA0BD21}" type="datetimeFigureOut">
               <a:rPr lang="en-US" smtClean="0"/>
-              <a:t>9/21/21</a:t>
+              <a:t>9/23/21</a:t>
             </a:fld>
             <a:endParaRPr lang="en-US"/>
           </a:p>
@@ -2734,7 +2735,7 @@
           <a:p>
             <a:fld id="{46569D23-BA87-4E43-A6F0-6EC25AA0BD21}" type="datetimeFigureOut">
               <a:rPr lang="en-US" smtClean="0"/>
-              <a:t>9/21/21</a:t>
+              <a:t>9/23/21</a:t>
             </a:fld>
             <a:endParaRPr lang="en-US"/>
           </a:p>
@@ -9843,11 +9844,7 @@
           <a:p>
             <a:r>
               <a:rPr lang="en-US" sz="3600" b="1" dirty="0" smtClean="0"/>
-              <a:t>Messages </a:t>
-            </a:r>
-            <a:r>
-              <a:rPr lang="en-US" sz="3600" b="1" dirty="0" smtClean="0"/>
-              <a:t>received by B after B’s local snapshot and before B receives marker</a:t>
+              <a:t>Messages received by B after B’s local snapshot and before B receives marker</a:t>
             </a:r>
             <a:endParaRPr lang="en-US" sz="3600" b="1" baseline="-25000" dirty="0"/>
           </a:p>
@@ -12888,6 +12885,1424 @@
       </p:par>
     </p:tnLst>
   </p:timing>
+</p:sld>
+</file>
+
+<file path=ppt/slides/slide16.xml><?xml version="1.0" encoding="utf-8"?>
+<p:sld xmlns:a="http://schemas.openxmlformats.org/drawingml/2006/main" xmlns:r="http://schemas.openxmlformats.org/officeDocument/2006/relationships" xmlns:p="http://schemas.openxmlformats.org/presentationml/2006/main">
+  <p:cSld>
+    <p:spTree>
+      <p:nvGrpSpPr>
+        <p:cNvPr id="1" name=""/>
+        <p:cNvGrpSpPr/>
+        <p:nvPr/>
+      </p:nvGrpSpPr>
+      <p:grpSpPr>
+        <a:xfrm>
+          <a:off x="0" y="0"/>
+          <a:ext cx="0" cy="0"/>
+          <a:chOff x="0" y="0"/>
+          <a:chExt cx="0" cy="0"/>
+        </a:xfrm>
+      </p:grpSpPr>
+      <p:cxnSp>
+        <p:nvCxnSpPr>
+          <p:cNvPr id="2" name="Straight Arrow Connector 1"/>
+          <p:cNvCxnSpPr/>
+          <p:nvPr/>
+        </p:nvCxnSpPr>
+        <p:spPr>
+          <a:xfrm flipV="1">
+            <a:off x="0" y="1844407"/>
+            <a:ext cx="8922606" cy="49548"/>
+          </a:xfrm>
+          <a:prstGeom prst="straightConnector1">
+            <a:avLst/>
+          </a:prstGeom>
+          <a:ln w="76200" cmpd="sng">
+            <a:tailEnd type="arrow"/>
+          </a:ln>
+        </p:spPr>
+        <p:style>
+          <a:lnRef idx="2">
+            <a:schemeClr val="accent1"/>
+          </a:lnRef>
+          <a:fillRef idx="0">
+            <a:schemeClr val="accent1"/>
+          </a:fillRef>
+          <a:effectRef idx="1">
+            <a:schemeClr val="accent1"/>
+          </a:effectRef>
+          <a:fontRef idx="minor">
+            <a:schemeClr val="tx1"/>
+          </a:fontRef>
+        </p:style>
+      </p:cxnSp>
+      <p:cxnSp>
+        <p:nvCxnSpPr>
+          <p:cNvPr id="3" name="Straight Arrow Connector 2"/>
+          <p:cNvCxnSpPr/>
+          <p:nvPr/>
+        </p:nvCxnSpPr>
+        <p:spPr>
+          <a:xfrm flipV="1">
+            <a:off x="0" y="3404226"/>
+            <a:ext cx="8922606" cy="38344"/>
+          </a:xfrm>
+          <a:prstGeom prst="straightConnector1">
+            <a:avLst/>
+          </a:prstGeom>
+          <a:ln w="76200" cmpd="sng">
+            <a:tailEnd type="arrow"/>
+          </a:ln>
+        </p:spPr>
+        <p:style>
+          <a:lnRef idx="2">
+            <a:schemeClr val="accent1"/>
+          </a:lnRef>
+          <a:fillRef idx="0">
+            <a:schemeClr val="accent1"/>
+          </a:fillRef>
+          <a:effectRef idx="1">
+            <a:schemeClr val="accent1"/>
+          </a:effectRef>
+          <a:fontRef idx="minor">
+            <a:schemeClr val="tx1"/>
+          </a:fontRef>
+        </p:style>
+      </p:cxnSp>
+      <p:cxnSp>
+        <p:nvCxnSpPr>
+          <p:cNvPr id="6" name="Straight Arrow Connector 5"/>
+          <p:cNvCxnSpPr/>
+          <p:nvPr/>
+        </p:nvCxnSpPr>
+        <p:spPr>
+          <a:xfrm>
+            <a:off x="641187" y="1844407"/>
+            <a:ext cx="4892249" cy="1535045"/>
+          </a:xfrm>
+          <a:prstGeom prst="straightConnector1">
+            <a:avLst/>
+          </a:prstGeom>
+          <a:ln w="76200" cmpd="sng">
+            <a:solidFill>
+              <a:srgbClr val="FF0000"/>
+            </a:solidFill>
+            <a:prstDash val="solid"/>
+            <a:tailEnd type="arrow"/>
+          </a:ln>
+        </p:spPr>
+        <p:style>
+          <a:lnRef idx="2">
+            <a:schemeClr val="accent1"/>
+          </a:lnRef>
+          <a:fillRef idx="0">
+            <a:schemeClr val="accent1"/>
+          </a:fillRef>
+          <a:effectRef idx="1">
+            <a:schemeClr val="accent1"/>
+          </a:effectRef>
+          <a:fontRef idx="minor">
+            <a:schemeClr val="tx1"/>
+          </a:fontRef>
+        </p:style>
+      </p:cxnSp>
+      <p:cxnSp>
+        <p:nvCxnSpPr>
+          <p:cNvPr id="7" name="Straight Arrow Connector 6"/>
+          <p:cNvCxnSpPr>
+            <a:stCxn id="27" idx="5"/>
+            <a:endCxn id="41" idx="0"/>
+          </p:cNvCxnSpPr>
+          <p:nvPr/>
+        </p:nvCxnSpPr>
+        <p:spPr>
+          <a:xfrm>
+            <a:off x="2970935" y="1978782"/>
+            <a:ext cx="3241326" cy="1313058"/>
+          </a:xfrm>
+          <a:prstGeom prst="straightConnector1">
+            <a:avLst/>
+          </a:prstGeom>
+          <a:ln w="57150" cmpd="sng">
+            <a:solidFill>
+              <a:srgbClr val="FF0000"/>
+            </a:solidFill>
+            <a:tailEnd type="arrow"/>
+          </a:ln>
+        </p:spPr>
+        <p:style>
+          <a:lnRef idx="2">
+            <a:schemeClr val="accent1"/>
+          </a:lnRef>
+          <a:fillRef idx="0">
+            <a:schemeClr val="accent1"/>
+          </a:fillRef>
+          <a:effectRef idx="1">
+            <a:schemeClr val="accent1"/>
+          </a:effectRef>
+          <a:fontRef idx="minor">
+            <a:schemeClr val="tx1"/>
+          </a:fontRef>
+        </p:style>
+      </p:cxnSp>
+      <p:sp>
+        <p:nvSpPr>
+          <p:cNvPr id="9" name="Freeform 8"/>
+          <p:cNvSpPr/>
+          <p:nvPr/>
+        </p:nvSpPr>
+        <p:spPr>
+          <a:xfrm>
+            <a:off x="1992853" y="1259631"/>
+            <a:ext cx="4189624" cy="2650870"/>
+          </a:xfrm>
+          <a:custGeom>
+            <a:avLst/>
+            <a:gdLst>
+              <a:gd name="connsiteX0" fmla="*/ 0 w 5263335"/>
+              <a:gd name="connsiteY0" fmla="*/ 2924520 h 2924520"/>
+              <a:gd name="connsiteX1" fmla="*/ 334180 w 5263335"/>
+              <a:gd name="connsiteY1" fmla="*/ 1771424 h 2924520"/>
+              <a:gd name="connsiteX2" fmla="*/ 1253175 w 5263335"/>
+              <a:gd name="connsiteY2" fmla="*/ 1403770 h 2924520"/>
+              <a:gd name="connsiteX3" fmla="*/ 4060287 w 5263335"/>
+              <a:gd name="connsiteY3" fmla="*/ 1136385 h 2924520"/>
+              <a:gd name="connsiteX4" fmla="*/ 5263335 w 5263335"/>
+              <a:gd name="connsiteY4" fmla="*/ 0 h 2924520"/>
+            </a:gdLst>
+            <a:ahLst/>
+            <a:cxnLst>
+              <a:cxn ang="0">
+                <a:pos x="connsiteX0" y="connsiteY0"/>
+              </a:cxn>
+              <a:cxn ang="0">
+                <a:pos x="connsiteX1" y="connsiteY1"/>
+              </a:cxn>
+              <a:cxn ang="0">
+                <a:pos x="connsiteX2" y="connsiteY2"/>
+              </a:cxn>
+              <a:cxn ang="0">
+                <a:pos x="connsiteX3" y="connsiteY3"/>
+              </a:cxn>
+              <a:cxn ang="0">
+                <a:pos x="connsiteX4" y="connsiteY4"/>
+              </a:cxn>
+            </a:cxnLst>
+            <a:rect l="l" t="t" r="r" b="b"/>
+            <a:pathLst>
+              <a:path w="5263335" h="2924520">
+                <a:moveTo>
+                  <a:pt x="0" y="2924520"/>
+                </a:moveTo>
+                <a:cubicBezTo>
+                  <a:pt x="62659" y="2474701"/>
+                  <a:pt x="125318" y="2024882"/>
+                  <a:pt x="334180" y="1771424"/>
+                </a:cubicBezTo>
+                <a:cubicBezTo>
+                  <a:pt x="543043" y="1517966"/>
+                  <a:pt x="632157" y="1509610"/>
+                  <a:pt x="1253175" y="1403770"/>
+                </a:cubicBezTo>
+                <a:cubicBezTo>
+                  <a:pt x="1874193" y="1297930"/>
+                  <a:pt x="3391927" y="1370347"/>
+                  <a:pt x="4060287" y="1136385"/>
+                </a:cubicBezTo>
+                <a:cubicBezTo>
+                  <a:pt x="4728647" y="902423"/>
+                  <a:pt x="4995991" y="451211"/>
+                  <a:pt x="5263335" y="0"/>
+                </a:cubicBezTo>
+              </a:path>
+            </a:pathLst>
+          </a:custGeom>
+          <a:ln w="76200" cmpd="sng">
+            <a:solidFill>
+              <a:srgbClr val="660066"/>
+            </a:solidFill>
+          </a:ln>
+        </p:spPr>
+        <p:style>
+          <a:lnRef idx="2">
+            <a:schemeClr val="accent1"/>
+          </a:lnRef>
+          <a:fillRef idx="0">
+            <a:schemeClr val="accent1"/>
+          </a:fillRef>
+          <a:effectRef idx="1">
+            <a:schemeClr val="accent1"/>
+          </a:effectRef>
+          <a:fontRef idx="minor">
+            <a:schemeClr val="tx1"/>
+          </a:fontRef>
+        </p:style>
+        <p:txBody>
+          <a:bodyPr rtlCol="0" anchor="ctr"/>
+          <a:lstStyle/>
+          <a:p>
+            <a:pPr algn="ctr"/>
+            <a:endParaRPr lang="en-US"/>
+          </a:p>
+        </p:txBody>
+      </p:sp>
+      <p:cxnSp>
+        <p:nvCxnSpPr>
+          <p:cNvPr id="17" name="Straight Arrow Connector 16"/>
+          <p:cNvCxnSpPr>
+            <a:endCxn id="45" idx="0"/>
+          </p:cNvCxnSpPr>
+          <p:nvPr/>
+        </p:nvCxnSpPr>
+        <p:spPr>
+          <a:xfrm>
+            <a:off x="7067907" y="1893955"/>
+            <a:ext cx="906611" cy="1373111"/>
+          </a:xfrm>
+          <a:prstGeom prst="straightConnector1">
+            <a:avLst/>
+          </a:prstGeom>
+          <a:ln w="76200" cmpd="sng">
+            <a:solidFill>
+              <a:srgbClr val="FF0000"/>
+            </a:solidFill>
+            <a:tailEnd type="arrow"/>
+          </a:ln>
+        </p:spPr>
+        <p:style>
+          <a:lnRef idx="2">
+            <a:schemeClr val="accent1"/>
+          </a:lnRef>
+          <a:fillRef idx="0">
+            <a:schemeClr val="accent1"/>
+          </a:fillRef>
+          <a:effectRef idx="1">
+            <a:schemeClr val="accent1"/>
+          </a:effectRef>
+          <a:fontRef idx="minor">
+            <a:schemeClr val="tx1"/>
+          </a:fontRef>
+        </p:style>
+      </p:cxnSp>
+      <p:sp>
+        <p:nvSpPr>
+          <p:cNvPr id="20" name="TextBox 19"/>
+          <p:cNvSpPr txBox="1"/>
+          <p:nvPr/>
+        </p:nvSpPr>
+        <p:spPr>
+          <a:xfrm>
+            <a:off x="8029369" y="1259631"/>
+            <a:ext cx="433332" cy="584776"/>
+          </a:xfrm>
+          <a:prstGeom prst="rect">
+            <a:avLst/>
+          </a:prstGeom>
+          <a:noFill/>
+        </p:spPr>
+        <p:txBody>
+          <a:bodyPr wrap="none" rtlCol="0">
+            <a:spAutoFit/>
+          </a:bodyPr>
+          <a:lstStyle/>
+          <a:p>
+            <a:r>
+              <a:rPr lang="en-US" sz="3200" b="1" dirty="0" smtClean="0"/>
+              <a:t>A</a:t>
+            </a:r>
+            <a:endParaRPr lang="en-US" sz="3200" b="1" dirty="0"/>
+          </a:p>
+        </p:txBody>
+      </p:sp>
+      <p:sp>
+        <p:nvSpPr>
+          <p:cNvPr id="21" name="TextBox 20"/>
+          <p:cNvSpPr txBox="1"/>
+          <p:nvPr/>
+        </p:nvSpPr>
+        <p:spPr>
+          <a:xfrm>
+            <a:off x="8175026" y="3429000"/>
+            <a:ext cx="414697" cy="584776"/>
+          </a:xfrm>
+          <a:prstGeom prst="rect">
+            <a:avLst/>
+          </a:prstGeom>
+          <a:noFill/>
+        </p:spPr>
+        <p:txBody>
+          <a:bodyPr wrap="none" rtlCol="0">
+            <a:spAutoFit/>
+          </a:bodyPr>
+          <a:lstStyle/>
+          <a:p>
+            <a:r>
+              <a:rPr lang="en-US" sz="3200" b="1" dirty="0"/>
+              <a:t>B</a:t>
+            </a:r>
+          </a:p>
+        </p:txBody>
+      </p:sp>
+      <p:sp>
+        <p:nvSpPr>
+          <p:cNvPr id="22" name="TextBox 21"/>
+          <p:cNvSpPr txBox="1"/>
+          <p:nvPr/>
+        </p:nvSpPr>
+        <p:spPr>
+          <a:xfrm>
+            <a:off x="1932603" y="1869181"/>
+            <a:ext cx="657151" cy="584776"/>
+          </a:xfrm>
+          <a:prstGeom prst="rect">
+            <a:avLst/>
+          </a:prstGeom>
+          <a:noFill/>
+        </p:spPr>
+        <p:txBody>
+          <a:bodyPr wrap="none" rtlCol="0">
+            <a:spAutoFit/>
+          </a:bodyPr>
+          <a:lstStyle/>
+          <a:p>
+            <a:r>
+              <a:rPr lang="en-US" sz="3200" b="1" dirty="0" smtClean="0"/>
+              <a:t>m</a:t>
+            </a:r>
+            <a:r>
+              <a:rPr lang="en-US" sz="3200" b="1" baseline="-25000" dirty="0" smtClean="0"/>
+              <a:t>1</a:t>
+            </a:r>
+            <a:endParaRPr lang="en-US" sz="3200" b="1" baseline="-25000" dirty="0"/>
+          </a:p>
+        </p:txBody>
+      </p:sp>
+      <p:sp>
+        <p:nvSpPr>
+          <p:cNvPr id="23" name="TextBox 22"/>
+          <p:cNvSpPr txBox="1"/>
+          <p:nvPr/>
+        </p:nvSpPr>
+        <p:spPr>
+          <a:xfrm>
+            <a:off x="5190999" y="2313969"/>
+            <a:ext cx="657151" cy="584776"/>
+          </a:xfrm>
+          <a:prstGeom prst="rect">
+            <a:avLst/>
+          </a:prstGeom>
+          <a:noFill/>
+        </p:spPr>
+        <p:txBody>
+          <a:bodyPr wrap="none" rtlCol="0">
+            <a:spAutoFit/>
+          </a:bodyPr>
+          <a:lstStyle/>
+          <a:p>
+            <a:r>
+              <a:rPr lang="en-US" sz="3200" b="1" dirty="0" smtClean="0"/>
+              <a:t>m</a:t>
+            </a:r>
+            <a:r>
+              <a:rPr lang="en-US" sz="3200" b="1" baseline="-25000" dirty="0" smtClean="0"/>
+              <a:t>2</a:t>
+            </a:r>
+            <a:endParaRPr lang="en-US" sz="3200" b="1" baseline="-25000" dirty="0"/>
+          </a:p>
+        </p:txBody>
+      </p:sp>
+      <p:sp>
+        <p:nvSpPr>
+          <p:cNvPr id="24" name="TextBox 23"/>
+          <p:cNvSpPr txBox="1"/>
+          <p:nvPr/>
+        </p:nvSpPr>
+        <p:spPr>
+          <a:xfrm>
+            <a:off x="7502341" y="2173981"/>
+            <a:ext cx="657151" cy="584776"/>
+          </a:xfrm>
+          <a:prstGeom prst="rect">
+            <a:avLst/>
+          </a:prstGeom>
+          <a:noFill/>
+        </p:spPr>
+        <p:txBody>
+          <a:bodyPr wrap="none" rtlCol="0">
+            <a:spAutoFit/>
+          </a:bodyPr>
+          <a:lstStyle/>
+          <a:p>
+            <a:r>
+              <a:rPr lang="en-US" sz="3200" b="1" dirty="0" smtClean="0"/>
+              <a:t>m</a:t>
+            </a:r>
+            <a:r>
+              <a:rPr lang="en-US" sz="3200" b="1" baseline="-25000" dirty="0"/>
+              <a:t>3</a:t>
+            </a:r>
+          </a:p>
+        </p:txBody>
+      </p:sp>
+      <p:sp>
+        <p:nvSpPr>
+          <p:cNvPr id="26" name="Oval 25"/>
+          <p:cNvSpPr>
+            <a:spLocks noChangeAspect="1"/>
+          </p:cNvSpPr>
+          <p:nvPr/>
+        </p:nvSpPr>
+        <p:spPr>
+          <a:xfrm>
+            <a:off x="547909" y="1744635"/>
+            <a:ext cx="274320" cy="274320"/>
+          </a:xfrm>
+          <a:prstGeom prst="ellipse">
+            <a:avLst/>
+          </a:prstGeom>
+        </p:spPr>
+        <p:style>
+          <a:lnRef idx="1">
+            <a:schemeClr val="accent1"/>
+          </a:lnRef>
+          <a:fillRef idx="3">
+            <a:schemeClr val="accent1"/>
+          </a:fillRef>
+          <a:effectRef idx="2">
+            <a:schemeClr val="accent1"/>
+          </a:effectRef>
+          <a:fontRef idx="minor">
+            <a:schemeClr val="lt1"/>
+          </a:fontRef>
+        </p:style>
+        <p:txBody>
+          <a:bodyPr rtlCol="0" anchor="ctr"/>
+          <a:lstStyle/>
+          <a:p>
+            <a:pPr algn="ctr"/>
+            <a:endParaRPr lang="en-US"/>
+          </a:p>
+        </p:txBody>
+      </p:sp>
+      <p:sp>
+        <p:nvSpPr>
+          <p:cNvPr id="27" name="Oval 26"/>
+          <p:cNvSpPr>
+            <a:spLocks noChangeAspect="1"/>
+          </p:cNvSpPr>
+          <p:nvPr/>
+        </p:nvSpPr>
+        <p:spPr>
+          <a:xfrm>
+            <a:off x="2736788" y="1744635"/>
+            <a:ext cx="274320" cy="274320"/>
+          </a:xfrm>
+          <a:prstGeom prst="ellipse">
+            <a:avLst/>
+          </a:prstGeom>
+        </p:spPr>
+        <p:style>
+          <a:lnRef idx="1">
+            <a:schemeClr val="accent1"/>
+          </a:lnRef>
+          <a:fillRef idx="3">
+            <a:schemeClr val="accent1"/>
+          </a:fillRef>
+          <a:effectRef idx="2">
+            <a:schemeClr val="accent1"/>
+          </a:effectRef>
+          <a:fontRef idx="minor">
+            <a:schemeClr val="lt1"/>
+          </a:fontRef>
+        </p:style>
+        <p:txBody>
+          <a:bodyPr rtlCol="0" anchor="ctr"/>
+          <a:lstStyle/>
+          <a:p>
+            <a:pPr algn="ctr"/>
+            <a:endParaRPr lang="en-US"/>
+          </a:p>
+        </p:txBody>
+      </p:sp>
+      <p:sp>
+        <p:nvSpPr>
+          <p:cNvPr id="28" name="Oval 27"/>
+          <p:cNvSpPr>
+            <a:spLocks noChangeAspect="1"/>
+          </p:cNvSpPr>
+          <p:nvPr/>
+        </p:nvSpPr>
+        <p:spPr>
+          <a:xfrm>
+            <a:off x="6930747" y="1707247"/>
+            <a:ext cx="274320" cy="274320"/>
+          </a:xfrm>
+          <a:prstGeom prst="ellipse">
+            <a:avLst/>
+          </a:prstGeom>
+          <a:solidFill>
+            <a:srgbClr val="3366FF"/>
+          </a:solidFill>
+          <a:ln>
+            <a:solidFill>
+              <a:srgbClr val="000090"/>
+            </a:solidFill>
+          </a:ln>
+        </p:spPr>
+        <p:style>
+          <a:lnRef idx="1">
+            <a:schemeClr val="accent1"/>
+          </a:lnRef>
+          <a:fillRef idx="3">
+            <a:schemeClr val="accent1"/>
+          </a:fillRef>
+          <a:effectRef idx="2">
+            <a:schemeClr val="accent1"/>
+          </a:effectRef>
+          <a:fontRef idx="minor">
+            <a:schemeClr val="lt1"/>
+          </a:fontRef>
+        </p:style>
+        <p:txBody>
+          <a:bodyPr rtlCol="0" anchor="ctr"/>
+          <a:lstStyle/>
+          <a:p>
+            <a:pPr algn="ctr"/>
+            <a:endParaRPr lang="en-US"/>
+          </a:p>
+        </p:txBody>
+      </p:sp>
+      <p:sp>
+        <p:nvSpPr>
+          <p:cNvPr id="29" name="Oval 28"/>
+          <p:cNvSpPr>
+            <a:spLocks noChangeAspect="1"/>
+          </p:cNvSpPr>
+          <p:nvPr/>
+        </p:nvSpPr>
+        <p:spPr>
+          <a:xfrm>
+            <a:off x="5523703" y="3291840"/>
+            <a:ext cx="274320" cy="274320"/>
+          </a:xfrm>
+          <a:prstGeom prst="ellipse">
+            <a:avLst/>
+          </a:prstGeom>
+          <a:solidFill>
+            <a:srgbClr val="FF6600"/>
+          </a:solidFill>
+          <a:ln>
+            <a:solidFill>
+              <a:srgbClr val="FF6600"/>
+            </a:solidFill>
+          </a:ln>
+        </p:spPr>
+        <p:style>
+          <a:lnRef idx="1">
+            <a:schemeClr val="accent1"/>
+          </a:lnRef>
+          <a:fillRef idx="3">
+            <a:schemeClr val="accent1"/>
+          </a:fillRef>
+          <a:effectRef idx="2">
+            <a:schemeClr val="accent1"/>
+          </a:effectRef>
+          <a:fontRef idx="minor">
+            <a:schemeClr val="lt1"/>
+          </a:fontRef>
+        </p:style>
+        <p:txBody>
+          <a:bodyPr rtlCol="0" anchor="ctr"/>
+          <a:lstStyle/>
+          <a:p>
+            <a:pPr algn="ctr"/>
+            <a:endParaRPr lang="en-US"/>
+          </a:p>
+        </p:txBody>
+      </p:sp>
+      <p:sp>
+        <p:nvSpPr>
+          <p:cNvPr id="33" name="Oval 32"/>
+          <p:cNvSpPr>
+            <a:spLocks noChangeAspect="1"/>
+          </p:cNvSpPr>
+          <p:nvPr/>
+        </p:nvSpPr>
+        <p:spPr>
+          <a:xfrm>
+            <a:off x="0" y="1744635"/>
+            <a:ext cx="274320" cy="274320"/>
+          </a:xfrm>
+          <a:prstGeom prst="ellipse">
+            <a:avLst/>
+          </a:prstGeom>
+        </p:spPr>
+        <p:style>
+          <a:lnRef idx="1">
+            <a:schemeClr val="accent1"/>
+          </a:lnRef>
+          <a:fillRef idx="3">
+            <a:schemeClr val="accent1"/>
+          </a:fillRef>
+          <a:effectRef idx="2">
+            <a:schemeClr val="accent1"/>
+          </a:effectRef>
+          <a:fontRef idx="minor">
+            <a:schemeClr val="lt1"/>
+          </a:fontRef>
+        </p:style>
+        <p:txBody>
+          <a:bodyPr rtlCol="0" anchor="ctr"/>
+          <a:lstStyle/>
+          <a:p>
+            <a:pPr algn="ctr"/>
+            <a:endParaRPr lang="en-US"/>
+          </a:p>
+        </p:txBody>
+      </p:sp>
+      <p:cxnSp>
+        <p:nvCxnSpPr>
+          <p:cNvPr id="34" name="Straight Arrow Connector 33"/>
+          <p:cNvCxnSpPr>
+            <a:stCxn id="33" idx="5"/>
+            <a:endCxn id="43" idx="1"/>
+          </p:cNvCxnSpPr>
+          <p:nvPr/>
+        </p:nvCxnSpPr>
+        <p:spPr>
+          <a:xfrm>
+            <a:off x="234147" y="1978782"/>
+            <a:ext cx="1208113" cy="1368471"/>
+          </a:xfrm>
+          <a:prstGeom prst="straightConnector1">
+            <a:avLst/>
+          </a:prstGeom>
+          <a:ln w="76200" cmpd="sng">
+            <a:solidFill>
+              <a:srgbClr val="FF0000"/>
+            </a:solidFill>
+            <a:prstDash val="solid"/>
+            <a:tailEnd type="arrow"/>
+          </a:ln>
+        </p:spPr>
+        <p:style>
+          <a:lnRef idx="2">
+            <a:schemeClr val="accent1"/>
+          </a:lnRef>
+          <a:fillRef idx="0">
+            <a:schemeClr val="accent1"/>
+          </a:fillRef>
+          <a:effectRef idx="1">
+            <a:schemeClr val="accent1"/>
+          </a:effectRef>
+          <a:fontRef idx="minor">
+            <a:schemeClr val="tx1"/>
+          </a:fontRef>
+        </p:style>
+      </p:cxnSp>
+      <p:sp>
+        <p:nvSpPr>
+          <p:cNvPr id="37" name="TextBox 36"/>
+          <p:cNvSpPr txBox="1"/>
+          <p:nvPr/>
+        </p:nvSpPr>
+        <p:spPr>
+          <a:xfrm>
+            <a:off x="698156" y="2173981"/>
+            <a:ext cx="657151" cy="584776"/>
+          </a:xfrm>
+          <a:prstGeom prst="rect">
+            <a:avLst/>
+          </a:prstGeom>
+          <a:noFill/>
+        </p:spPr>
+        <p:txBody>
+          <a:bodyPr wrap="none" rtlCol="0">
+            <a:spAutoFit/>
+          </a:bodyPr>
+          <a:lstStyle/>
+          <a:p>
+            <a:r>
+              <a:rPr lang="en-US" sz="3200" b="1" dirty="0" smtClean="0"/>
+              <a:t>m</a:t>
+            </a:r>
+            <a:r>
+              <a:rPr lang="en-US" sz="3200" b="1" baseline="-25000" dirty="0" smtClean="0"/>
+              <a:t>0</a:t>
+            </a:r>
+            <a:endParaRPr lang="en-US" sz="3200" b="1" baseline="-25000" dirty="0"/>
+          </a:p>
+        </p:txBody>
+      </p:sp>
+      <p:sp>
+        <p:nvSpPr>
+          <p:cNvPr id="41" name="Oval 40"/>
+          <p:cNvSpPr>
+            <a:spLocks noChangeAspect="1"/>
+          </p:cNvSpPr>
+          <p:nvPr/>
+        </p:nvSpPr>
+        <p:spPr>
+          <a:xfrm>
+            <a:off x="6075101" y="3291840"/>
+            <a:ext cx="274320" cy="274320"/>
+          </a:xfrm>
+          <a:prstGeom prst="ellipse">
+            <a:avLst/>
+          </a:prstGeom>
+          <a:solidFill>
+            <a:srgbClr val="FF6600"/>
+          </a:solidFill>
+          <a:ln>
+            <a:solidFill>
+              <a:srgbClr val="FF6600"/>
+            </a:solidFill>
+          </a:ln>
+        </p:spPr>
+        <p:style>
+          <a:lnRef idx="1">
+            <a:schemeClr val="accent1"/>
+          </a:lnRef>
+          <a:fillRef idx="3">
+            <a:schemeClr val="accent1"/>
+          </a:fillRef>
+          <a:effectRef idx="2">
+            <a:schemeClr val="accent1"/>
+          </a:effectRef>
+          <a:fontRef idx="minor">
+            <a:schemeClr val="lt1"/>
+          </a:fontRef>
+        </p:style>
+        <p:txBody>
+          <a:bodyPr rtlCol="0" anchor="ctr"/>
+          <a:lstStyle/>
+          <a:p>
+            <a:pPr algn="ctr"/>
+            <a:endParaRPr lang="en-US"/>
+          </a:p>
+        </p:txBody>
+      </p:sp>
+      <p:sp>
+        <p:nvSpPr>
+          <p:cNvPr id="43" name="Oval 42"/>
+          <p:cNvSpPr>
+            <a:spLocks noChangeAspect="1"/>
+          </p:cNvSpPr>
+          <p:nvPr/>
+        </p:nvSpPr>
+        <p:spPr>
+          <a:xfrm>
+            <a:off x="1402087" y="3307080"/>
+            <a:ext cx="274320" cy="274320"/>
+          </a:xfrm>
+          <a:prstGeom prst="ellipse">
+            <a:avLst/>
+          </a:prstGeom>
+          <a:solidFill>
+            <a:srgbClr val="FFFF00"/>
+          </a:solidFill>
+        </p:spPr>
+        <p:style>
+          <a:lnRef idx="1">
+            <a:schemeClr val="accent1"/>
+          </a:lnRef>
+          <a:fillRef idx="3">
+            <a:schemeClr val="accent1"/>
+          </a:fillRef>
+          <a:effectRef idx="2">
+            <a:schemeClr val="accent1"/>
+          </a:effectRef>
+          <a:fontRef idx="minor">
+            <a:schemeClr val="lt1"/>
+          </a:fontRef>
+        </p:style>
+        <p:txBody>
+          <a:bodyPr rtlCol="0" anchor="ctr"/>
+          <a:lstStyle/>
+          <a:p>
+            <a:pPr algn="ctr"/>
+            <a:endParaRPr lang="en-US"/>
+          </a:p>
+        </p:txBody>
+      </p:sp>
+      <p:sp>
+        <p:nvSpPr>
+          <p:cNvPr id="45" name="Oval 44"/>
+          <p:cNvSpPr>
+            <a:spLocks noChangeAspect="1"/>
+          </p:cNvSpPr>
+          <p:nvPr/>
+        </p:nvSpPr>
+        <p:spPr>
+          <a:xfrm>
+            <a:off x="7837358" y="3267066"/>
+            <a:ext cx="274320" cy="274320"/>
+          </a:xfrm>
+          <a:prstGeom prst="ellipse">
+            <a:avLst/>
+          </a:prstGeom>
+          <a:solidFill>
+            <a:srgbClr val="3366FF"/>
+          </a:solidFill>
+          <a:ln>
+            <a:solidFill>
+              <a:srgbClr val="000090"/>
+            </a:solidFill>
+          </a:ln>
+        </p:spPr>
+        <p:style>
+          <a:lnRef idx="1">
+            <a:schemeClr val="accent1"/>
+          </a:lnRef>
+          <a:fillRef idx="3">
+            <a:schemeClr val="accent1"/>
+          </a:fillRef>
+          <a:effectRef idx="2">
+            <a:schemeClr val="accent1"/>
+          </a:effectRef>
+          <a:fontRef idx="minor">
+            <a:schemeClr val="lt1"/>
+          </a:fontRef>
+        </p:style>
+        <p:txBody>
+          <a:bodyPr rtlCol="0" anchor="ctr"/>
+          <a:lstStyle/>
+          <a:p>
+            <a:pPr algn="ctr"/>
+            <a:endParaRPr lang="en-US"/>
+          </a:p>
+        </p:txBody>
+      </p:sp>
+      <p:cxnSp>
+        <p:nvCxnSpPr>
+          <p:cNvPr id="49" name="Straight Arrow Connector 48"/>
+          <p:cNvCxnSpPr>
+            <a:stCxn id="42" idx="0"/>
+            <a:endCxn id="43" idx="4"/>
+          </p:cNvCxnSpPr>
+          <p:nvPr/>
+        </p:nvCxnSpPr>
+        <p:spPr>
+          <a:xfrm flipV="1">
+            <a:off x="1320226" y="3581400"/>
+            <a:ext cx="219021" cy="790028"/>
+          </a:xfrm>
+          <a:prstGeom prst="straightConnector1">
+            <a:avLst/>
+          </a:prstGeom>
+          <a:ln>
+            <a:prstDash val="dash"/>
+            <a:tailEnd type="arrow"/>
+          </a:ln>
+        </p:spPr>
+        <p:style>
+          <a:lnRef idx="2">
+            <a:schemeClr val="accent1"/>
+          </a:lnRef>
+          <a:fillRef idx="0">
+            <a:schemeClr val="accent1"/>
+          </a:fillRef>
+          <a:effectRef idx="1">
+            <a:schemeClr val="accent1"/>
+          </a:effectRef>
+          <a:fontRef idx="minor">
+            <a:schemeClr val="tx1"/>
+          </a:fontRef>
+        </p:style>
+      </p:cxnSp>
+      <p:sp>
+        <p:nvSpPr>
+          <p:cNvPr id="50" name="TextBox 49"/>
+          <p:cNvSpPr txBox="1"/>
+          <p:nvPr/>
+        </p:nvSpPr>
+        <p:spPr>
+          <a:xfrm>
+            <a:off x="641187" y="457477"/>
+            <a:ext cx="1571063" cy="830997"/>
+          </a:xfrm>
+          <a:prstGeom prst="rect">
+            <a:avLst/>
+          </a:prstGeom>
+          <a:solidFill>
+            <a:srgbClr val="FFFF00"/>
+          </a:solidFill>
+          <a:ln>
+            <a:solidFill>
+              <a:srgbClr val="3366FF"/>
+            </a:solidFill>
+          </a:ln>
+        </p:spPr>
+        <p:txBody>
+          <a:bodyPr wrap="none" rtlCol="0">
+            <a:spAutoFit/>
+          </a:bodyPr>
+          <a:lstStyle/>
+          <a:p>
+            <a:r>
+              <a:rPr lang="en-US" sz="4800" b="1" dirty="0" smtClean="0"/>
+              <a:t>C</a:t>
+            </a:r>
+            <a:r>
+              <a:rPr lang="en-US" sz="4800" b="1" baseline="-25000" dirty="0" smtClean="0"/>
+              <a:t>s</a:t>
+            </a:r>
+            <a:r>
+              <a:rPr lang="en-US" sz="4800" b="1" dirty="0" smtClean="0"/>
+              <a:t> = 3</a:t>
+            </a:r>
+            <a:endParaRPr lang="en-US" sz="4800" b="1" baseline="-25000" dirty="0"/>
+          </a:p>
+        </p:txBody>
+      </p:sp>
+      <p:cxnSp>
+        <p:nvCxnSpPr>
+          <p:cNvPr id="52" name="Straight Arrow Connector 51"/>
+          <p:cNvCxnSpPr>
+            <a:stCxn id="50" idx="2"/>
+            <a:endCxn id="33" idx="7"/>
+          </p:cNvCxnSpPr>
+          <p:nvPr/>
+        </p:nvCxnSpPr>
+        <p:spPr>
+          <a:xfrm flipH="1">
+            <a:off x="234147" y="1288474"/>
+            <a:ext cx="1192572" cy="496334"/>
+          </a:xfrm>
+          <a:prstGeom prst="straightConnector1">
+            <a:avLst/>
+          </a:prstGeom>
+          <a:ln>
+            <a:prstDash val="dash"/>
+            <a:tailEnd type="arrow"/>
+          </a:ln>
+        </p:spPr>
+        <p:style>
+          <a:lnRef idx="2">
+            <a:schemeClr val="accent1"/>
+          </a:lnRef>
+          <a:fillRef idx="0">
+            <a:schemeClr val="accent1"/>
+          </a:fillRef>
+          <a:effectRef idx="1">
+            <a:schemeClr val="accent1"/>
+          </a:effectRef>
+          <a:fontRef idx="minor">
+            <a:schemeClr val="tx1"/>
+          </a:fontRef>
+        </p:style>
+      </p:cxnSp>
+      <p:cxnSp>
+        <p:nvCxnSpPr>
+          <p:cNvPr id="53" name="Straight Arrow Connector 52"/>
+          <p:cNvCxnSpPr>
+            <a:stCxn id="50" idx="2"/>
+            <a:endCxn id="26" idx="7"/>
+          </p:cNvCxnSpPr>
+          <p:nvPr/>
+        </p:nvCxnSpPr>
+        <p:spPr>
+          <a:xfrm flipH="1">
+            <a:off x="782056" y="1288474"/>
+            <a:ext cx="644663" cy="496334"/>
+          </a:xfrm>
+          <a:prstGeom prst="straightConnector1">
+            <a:avLst/>
+          </a:prstGeom>
+          <a:ln>
+            <a:prstDash val="dash"/>
+            <a:tailEnd type="arrow"/>
+          </a:ln>
+        </p:spPr>
+        <p:style>
+          <a:lnRef idx="2">
+            <a:schemeClr val="accent1"/>
+          </a:lnRef>
+          <a:fillRef idx="0">
+            <a:schemeClr val="accent1"/>
+          </a:fillRef>
+          <a:effectRef idx="1">
+            <a:schemeClr val="accent1"/>
+          </a:effectRef>
+          <a:fontRef idx="minor">
+            <a:schemeClr val="tx1"/>
+          </a:fontRef>
+        </p:style>
+      </p:cxnSp>
+      <p:cxnSp>
+        <p:nvCxnSpPr>
+          <p:cNvPr id="56" name="Straight Arrow Connector 55"/>
+          <p:cNvCxnSpPr>
+            <a:stCxn id="50" idx="2"/>
+            <a:endCxn id="27" idx="0"/>
+          </p:cNvCxnSpPr>
+          <p:nvPr/>
+        </p:nvCxnSpPr>
+        <p:spPr>
+          <a:xfrm>
+            <a:off x="1426719" y="1288474"/>
+            <a:ext cx="1447229" cy="456161"/>
+          </a:xfrm>
+          <a:prstGeom prst="straightConnector1">
+            <a:avLst/>
+          </a:prstGeom>
+          <a:ln>
+            <a:prstDash val="dash"/>
+            <a:tailEnd type="arrow"/>
+          </a:ln>
+        </p:spPr>
+        <p:style>
+          <a:lnRef idx="2">
+            <a:schemeClr val="accent1"/>
+          </a:lnRef>
+          <a:fillRef idx="0">
+            <a:schemeClr val="accent1"/>
+          </a:fillRef>
+          <a:effectRef idx="1">
+            <a:schemeClr val="accent1"/>
+          </a:effectRef>
+          <a:fontRef idx="minor">
+            <a:schemeClr val="tx1"/>
+          </a:fontRef>
+        </p:style>
+      </p:cxnSp>
+      <p:sp>
+        <p:nvSpPr>
+          <p:cNvPr id="91" name="TextBox 90"/>
+          <p:cNvSpPr txBox="1"/>
+          <p:nvPr/>
+        </p:nvSpPr>
+        <p:spPr>
+          <a:xfrm>
+            <a:off x="543611" y="5529802"/>
+            <a:ext cx="8228554" cy="707886"/>
+          </a:xfrm>
+          <a:prstGeom prst="rect">
+            <a:avLst/>
+          </a:prstGeom>
+          <a:solidFill>
+            <a:srgbClr val="FFFF00"/>
+          </a:solidFill>
+          <a:ln>
+            <a:solidFill>
+              <a:srgbClr val="FFFF00"/>
+            </a:solidFill>
+          </a:ln>
+        </p:spPr>
+        <p:txBody>
+          <a:bodyPr wrap="square" rtlCol="0">
+            <a:spAutoFit/>
+          </a:bodyPr>
+          <a:lstStyle/>
+          <a:p>
+            <a:r>
+              <a:rPr lang="en-US" sz="4000" b="1" dirty="0" smtClean="0"/>
+              <a:t>Cut is consistent if and </a:t>
+            </a:r>
+            <a:r>
+              <a:rPr lang="en-US" sz="4000" b="1" dirty="0"/>
+              <a:t>only </a:t>
+            </a:r>
+            <a:r>
+              <a:rPr lang="en-US" sz="4000" b="1" dirty="0" smtClean="0"/>
+              <a:t>if C</a:t>
+            </a:r>
+            <a:r>
+              <a:rPr lang="en-US" sz="4000" b="1" baseline="-25000" dirty="0" smtClean="0"/>
+              <a:t>s </a:t>
+            </a:r>
+            <a:r>
+              <a:rPr lang="en-US" sz="4000" b="1" dirty="0" smtClean="0"/>
+              <a:t>&gt;= C</a:t>
+            </a:r>
+            <a:r>
+              <a:rPr lang="en-US" sz="4000" b="1" baseline="-25000" dirty="0" smtClean="0"/>
+              <a:t>r</a:t>
+            </a:r>
+            <a:endParaRPr lang="en-US" sz="4000" b="1" baseline="-25000" dirty="0"/>
+          </a:p>
+        </p:txBody>
+      </p:sp>
+      <p:sp>
+        <p:nvSpPr>
+          <p:cNvPr id="42" name="TextBox 41"/>
+          <p:cNvSpPr txBox="1"/>
+          <p:nvPr/>
+        </p:nvSpPr>
+        <p:spPr>
+          <a:xfrm>
+            <a:off x="543611" y="4371428"/>
+            <a:ext cx="1553230" cy="830997"/>
+          </a:xfrm>
+          <a:prstGeom prst="rect">
+            <a:avLst/>
+          </a:prstGeom>
+          <a:solidFill>
+            <a:srgbClr val="FFFF00"/>
+          </a:solidFill>
+          <a:ln>
+            <a:solidFill>
+              <a:srgbClr val="3366FF"/>
+            </a:solidFill>
+          </a:ln>
+        </p:spPr>
+        <p:txBody>
+          <a:bodyPr wrap="none" rtlCol="0">
+            <a:spAutoFit/>
+          </a:bodyPr>
+          <a:lstStyle/>
+          <a:p>
+            <a:r>
+              <a:rPr lang="en-US" sz="4800" b="1" dirty="0" smtClean="0"/>
+              <a:t>C</a:t>
+            </a:r>
+            <a:r>
+              <a:rPr lang="en-US" sz="4800" b="1" baseline="-25000" dirty="0"/>
+              <a:t>r</a:t>
+            </a:r>
+            <a:r>
+              <a:rPr lang="en-US" sz="4800" b="1" dirty="0" smtClean="0"/>
+              <a:t> = 1</a:t>
+            </a:r>
+            <a:endParaRPr lang="en-US" sz="4800" b="1" baseline="-25000" dirty="0"/>
+          </a:p>
+        </p:txBody>
+      </p:sp>
+      <p:sp>
+        <p:nvSpPr>
+          <p:cNvPr id="46" name="Oval 45"/>
+          <p:cNvSpPr>
+            <a:spLocks noChangeAspect="1"/>
+          </p:cNvSpPr>
+          <p:nvPr/>
+        </p:nvSpPr>
+        <p:spPr>
+          <a:xfrm>
+            <a:off x="2739197" y="2447461"/>
+            <a:ext cx="274320" cy="274320"/>
+          </a:xfrm>
+          <a:prstGeom prst="ellipse">
+            <a:avLst/>
+          </a:prstGeom>
+          <a:solidFill>
+            <a:schemeClr val="tx1"/>
+          </a:solidFill>
+          <a:ln>
+            <a:solidFill>
+              <a:srgbClr val="000090"/>
+            </a:solidFill>
+          </a:ln>
+        </p:spPr>
+        <p:style>
+          <a:lnRef idx="1">
+            <a:schemeClr val="accent1"/>
+          </a:lnRef>
+          <a:fillRef idx="3">
+            <a:schemeClr val="accent1"/>
+          </a:fillRef>
+          <a:effectRef idx="2">
+            <a:schemeClr val="accent1"/>
+          </a:effectRef>
+          <a:fontRef idx="minor">
+            <a:schemeClr val="lt1"/>
+          </a:fontRef>
+        </p:style>
+        <p:txBody>
+          <a:bodyPr rtlCol="0" anchor="ctr"/>
+          <a:lstStyle/>
+          <a:p>
+            <a:pPr algn="ctr"/>
+            <a:endParaRPr lang="en-US"/>
+          </a:p>
+        </p:txBody>
+      </p:sp>
+      <p:sp>
+        <p:nvSpPr>
+          <p:cNvPr id="48" name="Oval 47"/>
+          <p:cNvSpPr>
+            <a:spLocks noChangeAspect="1"/>
+          </p:cNvSpPr>
+          <p:nvPr/>
+        </p:nvSpPr>
+        <p:spPr>
+          <a:xfrm>
+            <a:off x="3984858" y="2291750"/>
+            <a:ext cx="274320" cy="274320"/>
+          </a:xfrm>
+          <a:prstGeom prst="ellipse">
+            <a:avLst/>
+          </a:prstGeom>
+          <a:solidFill>
+            <a:schemeClr val="tx1"/>
+          </a:solidFill>
+          <a:ln>
+            <a:solidFill>
+              <a:srgbClr val="000090"/>
+            </a:solidFill>
+          </a:ln>
+        </p:spPr>
+        <p:style>
+          <a:lnRef idx="1">
+            <a:schemeClr val="accent1"/>
+          </a:lnRef>
+          <a:fillRef idx="3">
+            <a:schemeClr val="accent1"/>
+          </a:fillRef>
+          <a:effectRef idx="2">
+            <a:schemeClr val="accent1"/>
+          </a:effectRef>
+          <a:fontRef idx="minor">
+            <a:schemeClr val="lt1"/>
+          </a:fontRef>
+        </p:style>
+        <p:txBody>
+          <a:bodyPr rtlCol="0" anchor="ctr"/>
+          <a:lstStyle/>
+          <a:p>
+            <a:pPr algn="ctr"/>
+            <a:endParaRPr lang="en-US"/>
+          </a:p>
+        </p:txBody>
+      </p:sp>
+      <p:sp>
+        <p:nvSpPr>
+          <p:cNvPr id="51" name="TextBox 50"/>
+          <p:cNvSpPr txBox="1"/>
+          <p:nvPr/>
+        </p:nvSpPr>
+        <p:spPr>
+          <a:xfrm>
+            <a:off x="3768165" y="251809"/>
+            <a:ext cx="2581256" cy="830997"/>
+          </a:xfrm>
+          <a:prstGeom prst="rect">
+            <a:avLst/>
+          </a:prstGeom>
+          <a:solidFill>
+            <a:srgbClr val="FFFF00"/>
+          </a:solidFill>
+          <a:ln>
+            <a:solidFill>
+              <a:srgbClr val="3366FF"/>
+            </a:solidFill>
+          </a:ln>
+        </p:spPr>
+        <p:txBody>
+          <a:bodyPr wrap="none" rtlCol="0">
+            <a:spAutoFit/>
+          </a:bodyPr>
+          <a:lstStyle/>
+          <a:p>
+            <a:r>
+              <a:rPr lang="en-US" sz="4800" b="1" dirty="0" smtClean="0"/>
+              <a:t>C</a:t>
+            </a:r>
+            <a:r>
+              <a:rPr lang="en-US" sz="4800" b="1" baseline="-25000" dirty="0" smtClean="0"/>
+              <a:t>s</a:t>
+            </a:r>
+            <a:r>
+              <a:rPr lang="en-US" sz="4800" b="1" dirty="0" smtClean="0"/>
+              <a:t> – C</a:t>
+            </a:r>
+            <a:r>
+              <a:rPr lang="en-US" sz="4800" b="1" baseline="-25000" dirty="0" smtClean="0"/>
+              <a:t>r </a:t>
+            </a:r>
+            <a:r>
+              <a:rPr lang="en-US" sz="4800" b="1" dirty="0" smtClean="0"/>
+              <a:t>= 2</a:t>
+            </a:r>
+            <a:endParaRPr lang="en-US" sz="4800" b="1" baseline="-25000" dirty="0"/>
+          </a:p>
+        </p:txBody>
+      </p:sp>
+      <p:cxnSp>
+        <p:nvCxnSpPr>
+          <p:cNvPr id="18" name="Straight Arrow Connector 17"/>
+          <p:cNvCxnSpPr>
+            <a:stCxn id="51" idx="2"/>
+            <a:endCxn id="46" idx="0"/>
+          </p:cNvCxnSpPr>
+          <p:nvPr/>
+        </p:nvCxnSpPr>
+        <p:spPr>
+          <a:xfrm flipH="1">
+            <a:off x="2876357" y="1082806"/>
+            <a:ext cx="2182436" cy="1364655"/>
+          </a:xfrm>
+          <a:prstGeom prst="straightConnector1">
+            <a:avLst/>
+          </a:prstGeom>
+          <a:ln>
+            <a:prstDash val="dash"/>
+            <a:tailEnd type="arrow"/>
+          </a:ln>
+        </p:spPr>
+        <p:style>
+          <a:lnRef idx="2">
+            <a:schemeClr val="accent1"/>
+          </a:lnRef>
+          <a:fillRef idx="0">
+            <a:schemeClr val="accent1"/>
+          </a:fillRef>
+          <a:effectRef idx="1">
+            <a:schemeClr val="accent1"/>
+          </a:effectRef>
+          <a:fontRef idx="minor">
+            <a:schemeClr val="tx1"/>
+          </a:fontRef>
+        </p:style>
+      </p:cxnSp>
+      <p:cxnSp>
+        <p:nvCxnSpPr>
+          <p:cNvPr id="54" name="Straight Arrow Connector 53"/>
+          <p:cNvCxnSpPr>
+            <a:stCxn id="51" idx="2"/>
+            <a:endCxn id="48" idx="0"/>
+          </p:cNvCxnSpPr>
+          <p:nvPr/>
+        </p:nvCxnSpPr>
+        <p:spPr>
+          <a:xfrm flipH="1">
+            <a:off x="4122018" y="1082806"/>
+            <a:ext cx="936775" cy="1208944"/>
+          </a:xfrm>
+          <a:prstGeom prst="straightConnector1">
+            <a:avLst/>
+          </a:prstGeom>
+          <a:ln>
+            <a:prstDash val="dash"/>
+            <a:tailEnd type="arrow"/>
+          </a:ln>
+        </p:spPr>
+        <p:style>
+          <a:lnRef idx="2">
+            <a:schemeClr val="accent1"/>
+          </a:lnRef>
+          <a:fillRef idx="0">
+            <a:schemeClr val="accent1"/>
+          </a:fillRef>
+          <a:effectRef idx="1">
+            <a:schemeClr val="accent1"/>
+          </a:effectRef>
+          <a:fontRef idx="minor">
+            <a:schemeClr val="tx1"/>
+          </a:fontRef>
+        </p:style>
+      </p:cxnSp>
+    </p:spTree>
+    <p:extLst>
+      <p:ext uri="{BB962C8B-B14F-4D97-AF65-F5344CB8AC3E}">
+        <p14:creationId xmlns:p14="http://schemas.microsoft.com/office/powerpoint/2010/main" val="4190833307"/>
+      </p:ext>
+    </p:extLst>
+  </p:cSld>
+  <p:clrMapOvr>
+    <a:masterClrMapping/>
+  </p:clrMapOvr>
 </p:sld>
 </file>
 

</xml_diff>